<commit_message>
update L06 and L07
</commit_message>
<xml_diff>
--- a/lecture/Lecture 06 Sept 17/6 Data Cleaning, EDA.pptx
+++ b/lecture/Lecture 06 Sept 17/6 Data Cleaning, EDA.pptx
@@ -5,28 +5,38 @@
     <p:sldMasterId id="2147483648" r:id="rId1"/>
   </p:sldMasterIdLst>
   <p:notesMasterIdLst>
-    <p:notesMasterId r:id="rId21"/>
+    <p:notesMasterId r:id="rId31"/>
   </p:notesMasterIdLst>
   <p:sldIdLst>
     <p:sldId id="256" r:id="rId2"/>
-    <p:sldId id="323" r:id="rId3"/>
-    <p:sldId id="641" r:id="rId4"/>
-    <p:sldId id="324" r:id="rId5"/>
-    <p:sldId id="325" r:id="rId6"/>
-    <p:sldId id="328" r:id="rId7"/>
-    <p:sldId id="643" r:id="rId8"/>
-    <p:sldId id="326" r:id="rId9"/>
-    <p:sldId id="327" r:id="rId10"/>
-    <p:sldId id="603" r:id="rId11"/>
-    <p:sldId id="597" r:id="rId12"/>
-    <p:sldId id="640" r:id="rId13"/>
-    <p:sldId id="600" r:id="rId14"/>
-    <p:sldId id="515" r:id="rId15"/>
-    <p:sldId id="329" r:id="rId16"/>
-    <p:sldId id="330" r:id="rId17"/>
-    <p:sldId id="331" r:id="rId18"/>
-    <p:sldId id="639" r:id="rId19"/>
-    <p:sldId id="642" r:id="rId20"/>
+    <p:sldId id="648" r:id="rId3"/>
+    <p:sldId id="323" r:id="rId4"/>
+    <p:sldId id="644" r:id="rId5"/>
+    <p:sldId id="652" r:id="rId6"/>
+    <p:sldId id="641" r:id="rId7"/>
+    <p:sldId id="645" r:id="rId8"/>
+    <p:sldId id="646" r:id="rId9"/>
+    <p:sldId id="647" r:id="rId10"/>
+    <p:sldId id="651" r:id="rId11"/>
+    <p:sldId id="650" r:id="rId12"/>
+    <p:sldId id="649" r:id="rId13"/>
+    <p:sldId id="324" r:id="rId14"/>
+    <p:sldId id="325" r:id="rId15"/>
+    <p:sldId id="328" r:id="rId16"/>
+    <p:sldId id="643" r:id="rId17"/>
+    <p:sldId id="326" r:id="rId18"/>
+    <p:sldId id="327" r:id="rId19"/>
+    <p:sldId id="603" r:id="rId20"/>
+    <p:sldId id="597" r:id="rId21"/>
+    <p:sldId id="640" r:id="rId22"/>
+    <p:sldId id="600" r:id="rId23"/>
+    <p:sldId id="515" r:id="rId24"/>
+    <p:sldId id="329" r:id="rId25"/>
+    <p:sldId id="653" r:id="rId26"/>
+    <p:sldId id="330" r:id="rId27"/>
+    <p:sldId id="331" r:id="rId28"/>
+    <p:sldId id="639" r:id="rId29"/>
+    <p:sldId id="642" r:id="rId30"/>
   </p:sldIdLst>
   <p:sldSz cx="12192000" cy="6858000"/>
   <p:notesSz cx="6858000" cy="9144000"/>
@@ -215,7 +225,7 @@
           <a:p>
             <a:fld id="{4386939B-C2BD-984A-B580-7D8280183BCE}" type="datetimeFigureOut">
               <a:rPr lang="en-US" smtClean="0"/>
-              <a:t>9/16/19</a:t>
+              <a:t>9/19/19</a:t>
             </a:fld>
             <a:endParaRPr lang="en-US"/>
           </a:p>
@@ -526,6 +536,100 @@
           <a:bodyPr/>
           <a:lstStyle/>
           <a:p>
+            <a:r>
+              <a:rPr lang="en-US" dirty="0"/>
+              <a:t>From </a:t>
+            </a:r>
+            <a:r>
+              <a:rPr lang="en-US" dirty="0">
+                <a:hlinkClick r:id="rId3"/>
+              </a:rPr>
+              <a:t>https://waterkeeper.org/willful-failure-trump-administration-hits-new-low-environmental-enforcement/</a:t>
+            </a:r>
+            <a:endParaRPr lang="en-US" dirty="0"/>
+          </a:p>
+        </p:txBody>
+      </p:sp>
+      <p:sp>
+        <p:nvSpPr>
+          <p:cNvPr id="4" name="Slide Number Placeholder 3"/>
+          <p:cNvSpPr>
+            <a:spLocks noGrp="1"/>
+          </p:cNvSpPr>
+          <p:nvPr>
+            <p:ph type="sldNum" sz="quarter" idx="5"/>
+          </p:nvPr>
+        </p:nvSpPr>
+        <p:spPr/>
+        <p:txBody>
+          <a:bodyPr/>
+          <a:lstStyle/>
+          <a:p>
+            <a:fld id="{D819A83E-0401-A34D-9C72-7E11B0EBD118}" type="slidenum">
+              <a:rPr lang="en-US" smtClean="0"/>
+              <a:t>8</a:t>
+            </a:fld>
+            <a:endParaRPr lang="en-US"/>
+          </a:p>
+        </p:txBody>
+      </p:sp>
+    </p:spTree>
+    <p:extLst>
+      <p:ext uri="{BB962C8B-B14F-4D97-AF65-F5344CB8AC3E}">
+        <p14:creationId xmlns:p14="http://schemas.microsoft.com/office/powerpoint/2010/main" val="2253556175"/>
+      </p:ext>
+    </p:extLst>
+  </p:cSld>
+  <p:clrMapOvr>
+    <a:masterClrMapping/>
+  </p:clrMapOvr>
+</p:notes>
+</file>
+
+<file path=ppt/notesSlides/notesSlide2.xml><?xml version="1.0" encoding="utf-8"?>
+<p:notes xmlns:a="http://schemas.openxmlformats.org/drawingml/2006/main" xmlns:r="http://schemas.openxmlformats.org/officeDocument/2006/relationships" xmlns:p="http://schemas.openxmlformats.org/presentationml/2006/main">
+  <p:cSld>
+    <p:spTree>
+      <p:nvGrpSpPr>
+        <p:cNvPr id="1" name=""/>
+        <p:cNvGrpSpPr/>
+        <p:nvPr/>
+      </p:nvGrpSpPr>
+      <p:grpSpPr>
+        <a:xfrm>
+          <a:off x="0" y="0"/>
+          <a:ext cx="0" cy="0"/>
+          <a:chOff x="0" y="0"/>
+          <a:chExt cx="0" cy="0"/>
+        </a:xfrm>
+      </p:grpSpPr>
+      <p:sp>
+        <p:nvSpPr>
+          <p:cNvPr id="2" name="Slide Image Placeholder 1"/>
+          <p:cNvSpPr>
+            <a:spLocks noGrp="1" noRot="1" noChangeAspect="1"/>
+          </p:cNvSpPr>
+          <p:nvPr>
+            <p:ph type="sldImg"/>
+          </p:nvPr>
+        </p:nvSpPr>
+        <p:spPr/>
+      </p:sp>
+      <p:sp>
+        <p:nvSpPr>
+          <p:cNvPr id="3" name="Notes Placeholder 2"/>
+          <p:cNvSpPr>
+            <a:spLocks noGrp="1"/>
+          </p:cNvSpPr>
+          <p:nvPr>
+            <p:ph type="body" idx="1"/>
+          </p:nvPr>
+        </p:nvSpPr>
+        <p:spPr/>
+        <p:txBody>
+          <a:bodyPr/>
+          <a:lstStyle/>
+          <a:p>
             <a:endParaRPr lang="en-US" dirty="0"/>
           </a:p>
         </p:txBody>
@@ -548,7 +652,7 @@
             <a:fld id="{2032B9E8-698A-8948-9227-39339D245734}" type="slidenum">
               <a:rPr lang="en-US" smtClean="0"/>
               <a:pPr/>
-              <a:t>11</a:t>
+              <a:t>20</a:t>
             </a:fld>
             <a:endParaRPr lang="en-US" dirty="0"/>
           </a:p>
@@ -714,7 +818,7 @@
           <a:p>
             <a:fld id="{46306A39-2582-C049-94E7-BEE0043FE884}" type="datetime1">
               <a:rPr lang="en-US" smtClean="0"/>
-              <a:t>9/16/19</a:t>
+              <a:t>9/19/19</a:t>
             </a:fld>
             <a:endParaRPr lang="en-US"/>
           </a:p>
@@ -912,7 +1016,7 @@
           <a:p>
             <a:fld id="{B5216377-F808-3B4F-B5ED-C923DF8B2B7D}" type="datetime1">
               <a:rPr lang="en-US" smtClean="0"/>
-              <a:t>9/16/19</a:t>
+              <a:t>9/19/19</a:t>
             </a:fld>
             <a:endParaRPr lang="en-US"/>
           </a:p>
@@ -1120,7 +1224,7 @@
           <a:p>
             <a:fld id="{7C00BE73-2E81-E545-89E6-5FE841CFC5C1}" type="datetime1">
               <a:rPr lang="en-US" smtClean="0"/>
-              <a:t>9/16/19</a:t>
+              <a:t>9/19/19</a:t>
             </a:fld>
             <a:endParaRPr lang="en-US"/>
           </a:p>
@@ -1318,7 +1422,7 @@
           <a:p>
             <a:fld id="{B5E92DB6-AD97-F24C-96D2-5DF58CBA4156}" type="datetime1">
               <a:rPr lang="en-US" smtClean="0"/>
-              <a:t>9/16/19</a:t>
+              <a:t>9/19/19</a:t>
             </a:fld>
             <a:endParaRPr lang="en-US"/>
           </a:p>
@@ -1593,7 +1697,7 @@
           <a:p>
             <a:fld id="{FFD5026F-EF27-AD4B-95E3-2BE36BB285B7}" type="datetime1">
               <a:rPr lang="en-US" smtClean="0"/>
-              <a:t>9/16/19</a:t>
+              <a:t>9/19/19</a:t>
             </a:fld>
             <a:endParaRPr lang="en-US"/>
           </a:p>
@@ -1858,7 +1962,7 @@
           <a:p>
             <a:fld id="{BD23D610-A38E-1342-AE39-E6DBBE87239B}" type="datetime1">
               <a:rPr lang="en-US" smtClean="0"/>
-              <a:t>9/16/19</a:t>
+              <a:t>9/19/19</a:t>
             </a:fld>
             <a:endParaRPr lang="en-US"/>
           </a:p>
@@ -2270,7 +2374,7 @@
           <a:p>
             <a:fld id="{82CA847B-8994-F345-B32E-0BF3D62E57F2}" type="datetime1">
               <a:rPr lang="en-US" smtClean="0"/>
-              <a:t>9/16/19</a:t>
+              <a:t>9/19/19</a:t>
             </a:fld>
             <a:endParaRPr lang="en-US"/>
           </a:p>
@@ -2411,7 +2515,7 @@
           <a:p>
             <a:fld id="{71CB12B7-1BA8-4349-8BEA-09D14EF0D17A}" type="datetime1">
               <a:rPr lang="en-US" smtClean="0"/>
-              <a:t>9/16/19</a:t>
+              <a:t>9/19/19</a:t>
             </a:fld>
             <a:endParaRPr lang="en-US"/>
           </a:p>
@@ -2524,7 +2628,7 @@
           <a:p>
             <a:fld id="{BD9FA13E-B763-0340-9BB6-DB54BC8E8155}" type="datetime1">
               <a:rPr lang="en-US" smtClean="0"/>
-              <a:t>9/16/19</a:t>
+              <a:t>9/19/19</a:t>
             </a:fld>
             <a:endParaRPr lang="en-US"/>
           </a:p>
@@ -2835,7 +2939,7 @@
           <a:p>
             <a:fld id="{C52EE3F0-41CD-544C-B5B8-E3021A59C7EA}" type="datetime1">
               <a:rPr lang="en-US" smtClean="0"/>
-              <a:t>9/16/19</a:t>
+              <a:t>9/19/19</a:t>
             </a:fld>
             <a:endParaRPr lang="en-US"/>
           </a:p>
@@ -3123,7 +3227,7 @@
           <a:p>
             <a:fld id="{D299314F-D019-1248-962C-AA39828151A3}" type="datetime1">
               <a:rPr lang="en-US" smtClean="0"/>
-              <a:t>9/16/19</a:t>
+              <a:t>9/19/19</a:t>
             </a:fld>
             <a:endParaRPr lang="en-US"/>
           </a:p>
@@ -3364,7 +3468,7 @@
           <a:p>
             <a:fld id="{FC41ED63-A6DC-7E4E-8C59-87607DFC2790}" type="datetime1">
               <a:rPr lang="en-US" smtClean="0"/>
-              <a:t>9/16/19</a:t>
+              <a:t>9/19/19</a:t>
             </a:fld>
             <a:endParaRPr lang="en-US"/>
           </a:p>
@@ -3967,6 +4071,1584 @@
       </p:grpSpPr>
       <p:sp>
         <p:nvSpPr>
+          <p:cNvPr id="2" name="Title 1">
+            <a:extLst>
+              <a:ext uri="{FF2B5EF4-FFF2-40B4-BE49-F238E27FC236}">
+                <a16:creationId xmlns:a16="http://schemas.microsoft.com/office/drawing/2014/main" id="{C2B22313-08F8-0445-89A9-D8F5F989E91E}"/>
+              </a:ext>
+            </a:extLst>
+          </p:cNvPr>
+          <p:cNvSpPr>
+            <a:spLocks noGrp="1"/>
+          </p:cNvSpPr>
+          <p:nvPr>
+            <p:ph type="title"/>
+          </p:nvPr>
+        </p:nvSpPr>
+        <p:spPr/>
+        <p:txBody>
+          <a:bodyPr/>
+          <a:lstStyle/>
+          <a:p>
+            <a:r>
+              <a:rPr lang="en-US" dirty="0"/>
+              <a:t>Pelletier </a:t>
+            </a:r>
+            <a:r>
+              <a:rPr lang="en-US" i="1" dirty="0"/>
+              <a:t>et al</a:t>
+            </a:r>
+            <a:r>
+              <a:rPr lang="en-US" dirty="0"/>
+              <a:t>, </a:t>
+            </a:r>
+            <a:r>
+              <a:rPr lang="en-US" dirty="0" err="1"/>
+              <a:t>ctd</a:t>
+            </a:r>
+            <a:endParaRPr lang="en-US" dirty="0"/>
+          </a:p>
+        </p:txBody>
+      </p:sp>
+      <p:sp>
+        <p:nvSpPr>
+          <p:cNvPr id="3" name="Content Placeholder 2">
+            <a:extLst>
+              <a:ext uri="{FF2B5EF4-FFF2-40B4-BE49-F238E27FC236}">
+                <a16:creationId xmlns:a16="http://schemas.microsoft.com/office/drawing/2014/main" id="{1914C4C2-5084-BF40-8BC0-FAB206367776}"/>
+              </a:ext>
+            </a:extLst>
+          </p:cNvPr>
+          <p:cNvSpPr>
+            <a:spLocks noGrp="1"/>
+          </p:cNvSpPr>
+          <p:nvPr>
+            <p:ph idx="1"/>
+          </p:nvPr>
+        </p:nvSpPr>
+        <p:spPr>
+          <a:xfrm>
+            <a:off x="838200" y="1825625"/>
+            <a:ext cx="6996953" cy="4351338"/>
+          </a:xfrm>
+        </p:spPr>
+        <p:txBody>
+          <a:bodyPr/>
+          <a:lstStyle/>
+          <a:p>
+            <a:r>
+              <a:rPr lang="en-US" dirty="0"/>
+              <a:t>Some points of caution</a:t>
+            </a:r>
+          </a:p>
+          <a:p>
+            <a:pPr lvl="1"/>
+            <a:r>
+              <a:rPr lang="en-US" dirty="0"/>
+              <a:t>Be careful interpreting the error rate</a:t>
+            </a:r>
+          </a:p>
+          <a:p>
+            <a:pPr lvl="1"/>
+            <a:r>
+              <a:rPr lang="en-US" dirty="0"/>
+              <a:t>“Mean decrease in accuracy” metrics need to be interpreted with caution</a:t>
+            </a:r>
+          </a:p>
+          <a:p>
+            <a:pPr lvl="1"/>
+            <a:r>
+              <a:rPr lang="en-US" dirty="0"/>
+              <a:t>We will get to both issues later in the semester.</a:t>
+            </a:r>
+          </a:p>
+          <a:p>
+            <a:r>
+              <a:rPr lang="en-US" dirty="0"/>
+              <a:t>Strikingly different non-LC probabilities for different training data sets.</a:t>
+            </a:r>
+          </a:p>
+          <a:p>
+            <a:endParaRPr lang="en-US" dirty="0"/>
+          </a:p>
+        </p:txBody>
+      </p:sp>
+      <p:sp>
+        <p:nvSpPr>
+          <p:cNvPr id="4" name="Slide Number Placeholder 3">
+            <a:extLst>
+              <a:ext uri="{FF2B5EF4-FFF2-40B4-BE49-F238E27FC236}">
+                <a16:creationId xmlns:a16="http://schemas.microsoft.com/office/drawing/2014/main" id="{B5AB701B-3AAC-414D-AACB-4DAD71E27830}"/>
+              </a:ext>
+            </a:extLst>
+          </p:cNvPr>
+          <p:cNvSpPr>
+            <a:spLocks noGrp="1"/>
+          </p:cNvSpPr>
+          <p:nvPr>
+            <p:ph type="sldNum" sz="quarter" idx="12"/>
+          </p:nvPr>
+        </p:nvSpPr>
+        <p:spPr/>
+        <p:txBody>
+          <a:bodyPr/>
+          <a:lstStyle/>
+          <a:p>
+            <a:fld id="{934C0642-4071-7D48-AFF8-BD27182896CC}" type="slidenum">
+              <a:rPr lang="en-US" smtClean="0"/>
+              <a:t>10</a:t>
+            </a:fld>
+            <a:endParaRPr lang="en-US"/>
+          </a:p>
+        </p:txBody>
+      </p:sp>
+      <p:pic>
+        <p:nvPicPr>
+          <p:cNvPr id="6" name="Picture 5">
+            <a:extLst>
+              <a:ext uri="{FF2B5EF4-FFF2-40B4-BE49-F238E27FC236}">
+                <a16:creationId xmlns:a16="http://schemas.microsoft.com/office/drawing/2014/main" id="{6A6AEA9B-B71F-014E-A663-FA7739C19F05}"/>
+              </a:ext>
+            </a:extLst>
+          </p:cNvPr>
+          <p:cNvPicPr>
+            <a:picLocks noChangeAspect="1"/>
+          </p:cNvPicPr>
+          <p:nvPr/>
+        </p:nvPicPr>
+        <p:blipFill>
+          <a:blip r:embed="rId2"/>
+          <a:stretch>
+            <a:fillRect/>
+          </a:stretch>
+        </p:blipFill>
+        <p:spPr>
+          <a:xfrm>
+            <a:off x="8131362" y="365125"/>
+            <a:ext cx="2743200" cy="6242634"/>
+          </a:xfrm>
+          <a:prstGeom prst="rect">
+            <a:avLst/>
+          </a:prstGeom>
+        </p:spPr>
+      </p:pic>
+    </p:spTree>
+    <p:extLst>
+      <p:ext uri="{BB962C8B-B14F-4D97-AF65-F5344CB8AC3E}">
+        <p14:creationId xmlns:p14="http://schemas.microsoft.com/office/powerpoint/2010/main" val="2342542544"/>
+      </p:ext>
+    </p:extLst>
+  </p:cSld>
+  <p:clrMapOvr>
+    <a:masterClrMapping/>
+  </p:clrMapOvr>
+</p:sld>
+</file>
+
+<file path=ppt/slides/slide11.xml><?xml version="1.0" encoding="utf-8"?>
+<p:sld xmlns:a="http://schemas.openxmlformats.org/drawingml/2006/main" xmlns:r="http://schemas.openxmlformats.org/officeDocument/2006/relationships" xmlns:p="http://schemas.openxmlformats.org/presentationml/2006/main">
+  <p:cSld>
+    <p:spTree>
+      <p:nvGrpSpPr>
+        <p:cNvPr id="1" name=""/>
+        <p:cNvGrpSpPr/>
+        <p:nvPr/>
+      </p:nvGrpSpPr>
+      <p:grpSpPr>
+        <a:xfrm>
+          <a:off x="0" y="0"/>
+          <a:ext cx="0" cy="0"/>
+          <a:chOff x="0" y="0"/>
+          <a:chExt cx="0" cy="0"/>
+        </a:xfrm>
+      </p:grpSpPr>
+      <p:sp>
+        <p:nvSpPr>
+          <p:cNvPr id="2" name="Title 1">
+            <a:extLst>
+              <a:ext uri="{FF2B5EF4-FFF2-40B4-BE49-F238E27FC236}">
+                <a16:creationId xmlns:a16="http://schemas.microsoft.com/office/drawing/2014/main" id="{5BF50F5F-8B37-E24C-A6F8-034759F843A4}"/>
+              </a:ext>
+            </a:extLst>
+          </p:cNvPr>
+          <p:cNvSpPr>
+            <a:spLocks noGrp="1"/>
+          </p:cNvSpPr>
+          <p:nvPr>
+            <p:ph type="title"/>
+          </p:nvPr>
+        </p:nvSpPr>
+        <p:spPr/>
+        <p:txBody>
+          <a:bodyPr/>
+          <a:lstStyle/>
+          <a:p>
+            <a:r>
+              <a:rPr lang="en-US" dirty="0"/>
+              <a:t>Comparing the papers</a:t>
+            </a:r>
+          </a:p>
+        </p:txBody>
+      </p:sp>
+      <p:sp>
+        <p:nvSpPr>
+          <p:cNvPr id="3" name="Content Placeholder 2">
+            <a:extLst>
+              <a:ext uri="{FF2B5EF4-FFF2-40B4-BE49-F238E27FC236}">
+                <a16:creationId xmlns:a16="http://schemas.microsoft.com/office/drawing/2014/main" id="{EF0C2F26-46AE-F64B-A084-CAA0F5ECCDD5}"/>
+              </a:ext>
+            </a:extLst>
+          </p:cNvPr>
+          <p:cNvSpPr>
+            <a:spLocks noGrp="1"/>
+          </p:cNvSpPr>
+          <p:nvPr>
+            <p:ph idx="1"/>
+          </p:nvPr>
+        </p:nvSpPr>
+        <p:spPr/>
+        <p:txBody>
+          <a:bodyPr/>
+          <a:lstStyle/>
+          <a:p>
+            <a:r>
+              <a:rPr lang="en-US" dirty="0"/>
+              <a:t>Hino </a:t>
+            </a:r>
+            <a:r>
+              <a:rPr lang="en-US" i="1" dirty="0"/>
+              <a:t>et al</a:t>
+            </a:r>
+            <a:r>
+              <a:rPr lang="en-US" dirty="0"/>
+              <a:t> have more obvious justice and fairness implications.  Bias, it could be argued, matters more here.</a:t>
+            </a:r>
+          </a:p>
+          <a:p>
+            <a:r>
+              <a:rPr lang="en-US" dirty="0"/>
+              <a:t>Both have a common objective of predicting something we have not yet measured</a:t>
+            </a:r>
+          </a:p>
+        </p:txBody>
+      </p:sp>
+      <p:sp>
+        <p:nvSpPr>
+          <p:cNvPr id="4" name="Slide Number Placeholder 3">
+            <a:extLst>
+              <a:ext uri="{FF2B5EF4-FFF2-40B4-BE49-F238E27FC236}">
+                <a16:creationId xmlns:a16="http://schemas.microsoft.com/office/drawing/2014/main" id="{3830127A-A8B8-C74F-8045-46501488AAAD}"/>
+              </a:ext>
+            </a:extLst>
+          </p:cNvPr>
+          <p:cNvSpPr>
+            <a:spLocks noGrp="1"/>
+          </p:cNvSpPr>
+          <p:nvPr>
+            <p:ph type="sldNum" sz="quarter" idx="12"/>
+          </p:nvPr>
+        </p:nvSpPr>
+        <p:spPr/>
+        <p:txBody>
+          <a:bodyPr/>
+          <a:lstStyle/>
+          <a:p>
+            <a:fld id="{934C0642-4071-7D48-AFF8-BD27182896CC}" type="slidenum">
+              <a:rPr lang="en-US" smtClean="0"/>
+              <a:t>11</a:t>
+            </a:fld>
+            <a:endParaRPr lang="en-US"/>
+          </a:p>
+        </p:txBody>
+      </p:sp>
+    </p:spTree>
+    <p:extLst>
+      <p:ext uri="{BB962C8B-B14F-4D97-AF65-F5344CB8AC3E}">
+        <p14:creationId xmlns:p14="http://schemas.microsoft.com/office/powerpoint/2010/main" val="487914165"/>
+      </p:ext>
+    </p:extLst>
+  </p:cSld>
+  <p:clrMapOvr>
+    <a:masterClrMapping/>
+  </p:clrMapOvr>
+  <p:timing>
+    <p:tnLst>
+      <p:par>
+        <p:cTn id="1" dur="indefinite" restart="never" nodeType="tmRoot">
+          <p:childTnLst>
+            <p:seq concurrent="1" nextAc="seek">
+              <p:cTn id="2" dur="indefinite" nodeType="mainSeq">
+                <p:childTnLst>
+                  <p:par>
+                    <p:cTn id="3" fill="hold">
+                      <p:stCondLst>
+                        <p:cond delay="indefinite"/>
+                      </p:stCondLst>
+                      <p:childTnLst>
+                        <p:par>
+                          <p:cTn id="4" fill="hold">
+                            <p:stCondLst>
+                              <p:cond delay="0"/>
+                            </p:stCondLst>
+                            <p:childTnLst>
+                              <p:par>
+                                <p:cTn id="5" presetID="1" presetClass="entr" presetSubtype="0" fill="hold" nodeType="clickEffect">
+                                  <p:stCondLst>
+                                    <p:cond delay="0"/>
+                                  </p:stCondLst>
+                                  <p:childTnLst>
+                                    <p:set>
+                                      <p:cBhvr>
+                                        <p:cTn id="6" dur="1" fill="hold">
+                                          <p:stCondLst>
+                                            <p:cond delay="0"/>
+                                          </p:stCondLst>
+                                        </p:cTn>
+                                        <p:tgtEl>
+                                          <p:spTgt spid="3">
+                                            <p:txEl>
+                                              <p:pRg st="0" end="0"/>
+                                            </p:txEl>
+                                          </p:spTgt>
+                                        </p:tgtEl>
+                                        <p:attrNameLst>
+                                          <p:attrName>style.visibility</p:attrName>
+                                        </p:attrNameLst>
+                                      </p:cBhvr>
+                                      <p:to>
+                                        <p:strVal val="visible"/>
+                                      </p:to>
+                                    </p:set>
+                                  </p:childTnLst>
+                                </p:cTn>
+                              </p:par>
+                              <p:par>
+                                <p:cTn id="7" presetID="1" presetClass="entr" presetSubtype="0" fill="hold" nodeType="withEffect">
+                                  <p:stCondLst>
+                                    <p:cond delay="0"/>
+                                  </p:stCondLst>
+                                  <p:childTnLst>
+                                    <p:set>
+                                      <p:cBhvr>
+                                        <p:cTn id="8" dur="1" fill="hold">
+                                          <p:stCondLst>
+                                            <p:cond delay="0"/>
+                                          </p:stCondLst>
+                                        </p:cTn>
+                                        <p:tgtEl>
+                                          <p:spTgt spid="3">
+                                            <p:txEl>
+                                              <p:pRg st="1" end="1"/>
+                                            </p:txEl>
+                                          </p:spTgt>
+                                        </p:tgtEl>
+                                        <p:attrNameLst>
+                                          <p:attrName>style.visibility</p:attrName>
+                                        </p:attrNameLst>
+                                      </p:cBhvr>
+                                      <p:to>
+                                        <p:strVal val="visible"/>
+                                      </p:to>
+                                    </p:set>
+                                  </p:childTnLst>
+                                </p:cTn>
+                              </p:par>
+                            </p:childTnLst>
+                          </p:cTn>
+                        </p:par>
+                      </p:childTnLst>
+                    </p:cTn>
+                  </p:par>
+                </p:childTnLst>
+              </p:cTn>
+              <p:prevCondLst>
+                <p:cond evt="onPrev" delay="0">
+                  <p:tgtEl>
+                    <p:sldTgt/>
+                  </p:tgtEl>
+                </p:cond>
+              </p:prevCondLst>
+              <p:nextCondLst>
+                <p:cond evt="onNext" delay="0">
+                  <p:tgtEl>
+                    <p:sldTgt/>
+                  </p:tgtEl>
+                </p:cond>
+              </p:nextCondLst>
+            </p:seq>
+          </p:childTnLst>
+        </p:cTn>
+      </p:par>
+    </p:tnLst>
+  </p:timing>
+</p:sld>
+</file>
+
+<file path=ppt/slides/slide12.xml><?xml version="1.0" encoding="utf-8"?>
+<p:sld xmlns:a="http://schemas.openxmlformats.org/drawingml/2006/main" xmlns:r="http://schemas.openxmlformats.org/officeDocument/2006/relationships" xmlns:p="http://schemas.openxmlformats.org/presentationml/2006/main">
+  <p:cSld>
+    <p:spTree>
+      <p:nvGrpSpPr>
+        <p:cNvPr id="1" name=""/>
+        <p:cNvGrpSpPr/>
+        <p:nvPr/>
+      </p:nvGrpSpPr>
+      <p:grpSpPr>
+        <a:xfrm>
+          <a:off x="0" y="0"/>
+          <a:ext cx="0" cy="0"/>
+          <a:chOff x="0" y="0"/>
+          <a:chExt cx="0" cy="0"/>
+        </a:xfrm>
+      </p:grpSpPr>
+      <p:pic>
+        <p:nvPicPr>
+          <p:cNvPr id="7" name="Picture 6">
+            <a:extLst>
+              <a:ext uri="{FF2B5EF4-FFF2-40B4-BE49-F238E27FC236}">
+                <a16:creationId xmlns:a16="http://schemas.microsoft.com/office/drawing/2014/main" id="{C76D1CCC-F6DF-DF41-B027-D29D5E5B592B}"/>
+              </a:ext>
+            </a:extLst>
+          </p:cNvPr>
+          <p:cNvPicPr>
+            <a:picLocks noChangeAspect="1"/>
+          </p:cNvPicPr>
+          <p:nvPr/>
+        </p:nvPicPr>
+        <p:blipFill>
+          <a:blip r:embed="rId2"/>
+          <a:stretch>
+            <a:fillRect/>
+          </a:stretch>
+        </p:blipFill>
+        <p:spPr>
+          <a:xfrm>
+            <a:off x="643965" y="836722"/>
+            <a:ext cx="8697259" cy="5617959"/>
+          </a:xfrm>
+          <a:prstGeom prst="rect">
+            <a:avLst/>
+          </a:prstGeom>
+        </p:spPr>
+      </p:pic>
+      <p:sp>
+        <p:nvSpPr>
+          <p:cNvPr id="2" name="Title 1">
+            <a:extLst>
+              <a:ext uri="{FF2B5EF4-FFF2-40B4-BE49-F238E27FC236}">
+                <a16:creationId xmlns:a16="http://schemas.microsoft.com/office/drawing/2014/main" id="{33825DE9-BCB8-3F49-9C79-A64A29C1A301}"/>
+              </a:ext>
+            </a:extLst>
+          </p:cNvPr>
+          <p:cNvSpPr>
+            <a:spLocks noGrp="1"/>
+          </p:cNvSpPr>
+          <p:nvPr>
+            <p:ph type="title"/>
+          </p:nvPr>
+        </p:nvSpPr>
+        <p:spPr>
+          <a:xfrm>
+            <a:off x="5307106" y="365125"/>
+            <a:ext cx="6046694" cy="1325563"/>
+          </a:xfrm>
+        </p:spPr>
+        <p:txBody>
+          <a:bodyPr/>
+          <a:lstStyle/>
+          <a:p>
+            <a:r>
+              <a:rPr lang="en-US" dirty="0"/>
+              <a:t>Do these approaches </a:t>
+            </a:r>
+            <a:r>
+              <a:rPr lang="en-US" i="1" dirty="0"/>
+              <a:t>really</a:t>
+            </a:r>
+            <a:r>
+              <a:rPr lang="en-US" dirty="0"/>
+              <a:t> work?  Go find out!</a:t>
+            </a:r>
+          </a:p>
+        </p:txBody>
+      </p:sp>
+      <p:sp>
+        <p:nvSpPr>
+          <p:cNvPr id="4" name="Slide Number Placeholder 3">
+            <a:extLst>
+              <a:ext uri="{FF2B5EF4-FFF2-40B4-BE49-F238E27FC236}">
+                <a16:creationId xmlns:a16="http://schemas.microsoft.com/office/drawing/2014/main" id="{033CEC1C-F016-5141-976A-993E6A8CD7A7}"/>
+              </a:ext>
+            </a:extLst>
+          </p:cNvPr>
+          <p:cNvSpPr>
+            <a:spLocks noGrp="1"/>
+          </p:cNvSpPr>
+          <p:nvPr>
+            <p:ph type="sldNum" sz="quarter" idx="12"/>
+          </p:nvPr>
+        </p:nvSpPr>
+        <p:spPr/>
+        <p:txBody>
+          <a:bodyPr/>
+          <a:lstStyle/>
+          <a:p>
+            <a:fld id="{934C0642-4071-7D48-AFF8-BD27182896CC}" type="slidenum">
+              <a:rPr lang="en-US" smtClean="0"/>
+              <a:t>12</a:t>
+            </a:fld>
+            <a:endParaRPr lang="en-US"/>
+          </a:p>
+        </p:txBody>
+      </p:sp>
+    </p:spTree>
+    <p:extLst>
+      <p:ext uri="{BB962C8B-B14F-4D97-AF65-F5344CB8AC3E}">
+        <p14:creationId xmlns:p14="http://schemas.microsoft.com/office/powerpoint/2010/main" val="1535786"/>
+      </p:ext>
+    </p:extLst>
+  </p:cSld>
+  <p:clrMapOvr>
+    <a:masterClrMapping/>
+  </p:clrMapOvr>
+</p:sld>
+</file>
+
+<file path=ppt/slides/slide13.xml><?xml version="1.0" encoding="utf-8"?>
+<p:sld xmlns:a="http://schemas.openxmlformats.org/drawingml/2006/main" xmlns:r="http://schemas.openxmlformats.org/officeDocument/2006/relationships" xmlns:p="http://schemas.openxmlformats.org/presentationml/2006/main">
+  <p:cSld>
+    <p:spTree>
+      <p:nvGrpSpPr>
+        <p:cNvPr id="1" name=""/>
+        <p:cNvGrpSpPr/>
+        <p:nvPr/>
+      </p:nvGrpSpPr>
+      <p:grpSpPr>
+        <a:xfrm>
+          <a:off x="0" y="0"/>
+          <a:ext cx="0" cy="0"/>
+          <a:chOff x="0" y="0"/>
+          <a:chExt cx="0" cy="0"/>
+        </a:xfrm>
+      </p:grpSpPr>
+      <p:sp>
+        <p:nvSpPr>
+          <p:cNvPr id="2" name="Title 1">
+            <a:extLst>
+              <a:ext uri="{FF2B5EF4-FFF2-40B4-BE49-F238E27FC236}">
+                <a16:creationId xmlns:a16="http://schemas.microsoft.com/office/drawing/2014/main" id="{423B989D-7A2B-6F4E-9CD9-A149D73A85A8}"/>
+              </a:ext>
+            </a:extLst>
+          </p:cNvPr>
+          <p:cNvSpPr>
+            <a:spLocks noGrp="1"/>
+          </p:cNvSpPr>
+          <p:nvPr>
+            <p:ph type="title"/>
+          </p:nvPr>
+        </p:nvSpPr>
+        <p:spPr/>
+        <p:txBody>
+          <a:bodyPr/>
+          <a:lstStyle/>
+          <a:p>
+            <a:r>
+              <a:rPr lang="en-US" dirty="0"/>
+              <a:t>Questions for data cleaning</a:t>
+            </a:r>
+          </a:p>
+        </p:txBody>
+      </p:sp>
+      <p:sp>
+        <p:nvSpPr>
+          <p:cNvPr id="3" name="Content Placeholder 2">
+            <a:extLst>
+              <a:ext uri="{FF2B5EF4-FFF2-40B4-BE49-F238E27FC236}">
+                <a16:creationId xmlns:a16="http://schemas.microsoft.com/office/drawing/2014/main" id="{13FD5E8A-16D3-A541-9C5F-24816BFD8995}"/>
+              </a:ext>
+            </a:extLst>
+          </p:cNvPr>
+          <p:cNvSpPr>
+            <a:spLocks noGrp="1"/>
+          </p:cNvSpPr>
+          <p:nvPr>
+            <p:ph idx="1"/>
+          </p:nvPr>
+        </p:nvSpPr>
+        <p:spPr/>
+        <p:txBody>
+          <a:bodyPr/>
+          <a:lstStyle/>
+          <a:p>
+            <a:r>
+              <a:rPr lang="en-US" dirty="0"/>
+              <a:t>Do you see missing values?</a:t>
+            </a:r>
+          </a:p>
+          <a:p>
+            <a:r>
+              <a:rPr lang="en-US" dirty="0"/>
+              <a:t>Are there cells where missing values were obviously filled in?</a:t>
+            </a:r>
+          </a:p>
+          <a:p>
+            <a:r>
+              <a:rPr lang="en-US" dirty="0"/>
+              <a:t>Are there cells where values are clearly wrong?</a:t>
+            </a:r>
+          </a:p>
+          <a:p>
+            <a:r>
+              <a:rPr lang="en-US" dirty="0"/>
+              <a:t>Are there values where two entries could mean the same thing?  Often human-entered values, e.g.:  </a:t>
+            </a:r>
+          </a:p>
+          <a:p>
+            <a:pPr lvl="1"/>
+            <a:r>
+              <a:rPr lang="en-US" dirty="0"/>
+              <a:t>canine and k9; </a:t>
+            </a:r>
+          </a:p>
+          <a:p>
+            <a:pPr lvl="1"/>
+            <a:r>
+              <a:rPr lang="en-US" dirty="0"/>
+              <a:t>recommend and recommend, </a:t>
+            </a:r>
+          </a:p>
+          <a:p>
+            <a:pPr lvl="1"/>
+            <a:r>
+              <a:rPr lang="en-US" dirty="0"/>
+              <a:t>Zürich and Zurich </a:t>
+            </a:r>
+            <a:r>
+              <a:rPr lang="en-US" dirty="0" err="1"/>
+              <a:t>etc</a:t>
+            </a:r>
+            <a:endParaRPr lang="en-US" dirty="0"/>
+          </a:p>
+          <a:p>
+            <a:pPr lvl="1"/>
+            <a:endParaRPr lang="en-US" dirty="0"/>
+          </a:p>
+        </p:txBody>
+      </p:sp>
+      <p:sp>
+        <p:nvSpPr>
+          <p:cNvPr id="4" name="Slide Number Placeholder 3">
+            <a:extLst>
+              <a:ext uri="{FF2B5EF4-FFF2-40B4-BE49-F238E27FC236}">
+                <a16:creationId xmlns:a16="http://schemas.microsoft.com/office/drawing/2014/main" id="{4595E02E-464F-6D42-8E8B-67C4F3E0D890}"/>
+              </a:ext>
+            </a:extLst>
+          </p:cNvPr>
+          <p:cNvSpPr>
+            <a:spLocks noGrp="1"/>
+          </p:cNvSpPr>
+          <p:nvPr>
+            <p:ph type="sldNum" sz="quarter" idx="12"/>
+          </p:nvPr>
+        </p:nvSpPr>
+        <p:spPr/>
+        <p:txBody>
+          <a:bodyPr/>
+          <a:lstStyle/>
+          <a:p>
+            <a:fld id="{934C0642-4071-7D48-AFF8-BD27182896CC}" type="slidenum">
+              <a:rPr lang="en-US" smtClean="0"/>
+              <a:t>13</a:t>
+            </a:fld>
+            <a:endParaRPr lang="en-US"/>
+          </a:p>
+        </p:txBody>
+      </p:sp>
+    </p:spTree>
+    <p:extLst>
+      <p:ext uri="{BB962C8B-B14F-4D97-AF65-F5344CB8AC3E}">
+        <p14:creationId xmlns:p14="http://schemas.microsoft.com/office/powerpoint/2010/main" val="4279606409"/>
+      </p:ext>
+    </p:extLst>
+  </p:cSld>
+  <p:clrMapOvr>
+    <a:masterClrMapping/>
+  </p:clrMapOvr>
+</p:sld>
+</file>
+
+<file path=ppt/slides/slide14.xml><?xml version="1.0" encoding="utf-8"?>
+<p:sld xmlns:a="http://schemas.openxmlformats.org/drawingml/2006/main" xmlns:r="http://schemas.openxmlformats.org/officeDocument/2006/relationships" xmlns:p="http://schemas.openxmlformats.org/presentationml/2006/main">
+  <p:cSld>
+    <p:spTree>
+      <p:nvGrpSpPr>
+        <p:cNvPr id="1" name=""/>
+        <p:cNvGrpSpPr/>
+        <p:nvPr/>
+      </p:nvGrpSpPr>
+      <p:grpSpPr>
+        <a:xfrm>
+          <a:off x="0" y="0"/>
+          <a:ext cx="0" cy="0"/>
+          <a:chOff x="0" y="0"/>
+          <a:chExt cx="0" cy="0"/>
+        </a:xfrm>
+      </p:grpSpPr>
+      <p:sp>
+        <p:nvSpPr>
+          <p:cNvPr id="2" name="Title 1">
+            <a:extLst>
+              <a:ext uri="{FF2B5EF4-FFF2-40B4-BE49-F238E27FC236}">
+                <a16:creationId xmlns:a16="http://schemas.microsoft.com/office/drawing/2014/main" id="{4F90A4E4-2B39-CA47-883B-9AD2AAAAFE27}"/>
+              </a:ext>
+            </a:extLst>
+          </p:cNvPr>
+          <p:cNvSpPr>
+            <a:spLocks noGrp="1"/>
+          </p:cNvSpPr>
+          <p:nvPr>
+            <p:ph type="title"/>
+          </p:nvPr>
+        </p:nvSpPr>
+        <p:spPr/>
+        <p:txBody>
+          <a:bodyPr/>
+          <a:lstStyle/>
+          <a:p>
+            <a:r>
+              <a:rPr lang="en-US" dirty="0"/>
+              <a:t>Data merging</a:t>
+            </a:r>
+          </a:p>
+        </p:txBody>
+      </p:sp>
+      <p:sp>
+        <p:nvSpPr>
+          <p:cNvPr id="3" name="Content Placeholder 2">
+            <a:extLst>
+              <a:ext uri="{FF2B5EF4-FFF2-40B4-BE49-F238E27FC236}">
+                <a16:creationId xmlns:a16="http://schemas.microsoft.com/office/drawing/2014/main" id="{6DAF17E0-2358-DE43-AFF3-F2DEC9D73ADB}"/>
+              </a:ext>
+            </a:extLst>
+          </p:cNvPr>
+          <p:cNvSpPr>
+            <a:spLocks noGrp="1"/>
+          </p:cNvSpPr>
+          <p:nvPr>
+            <p:ph idx="1"/>
+          </p:nvPr>
+        </p:nvSpPr>
+        <p:spPr/>
+        <p:txBody>
+          <a:bodyPr/>
+          <a:lstStyle/>
+          <a:p>
+            <a:r>
+              <a:rPr lang="en-US" dirty="0"/>
+              <a:t>How many rows and columns do you have when you start?</a:t>
+            </a:r>
+          </a:p>
+          <a:p>
+            <a:r>
+              <a:rPr lang="en-US" dirty="0"/>
+              <a:t>How many do you have after the merge?</a:t>
+            </a:r>
+          </a:p>
+          <a:p>
+            <a:r>
+              <a:rPr lang="en-US" dirty="0"/>
+              <a:t>What’s missing?  Is it acceptable to you if you’ve lost some data?</a:t>
+            </a:r>
+          </a:p>
+          <a:p>
+            <a:pPr lvl="1"/>
+            <a:r>
+              <a:rPr lang="en-US" dirty="0"/>
+              <a:t>We’ll return to this when we talk about faithfulness and scope.  </a:t>
+            </a:r>
+          </a:p>
+          <a:p>
+            <a:r>
+              <a:rPr lang="en-US" dirty="0"/>
+              <a:t>I wrote a script for the class to use in the upcoming homework that helps decipher what data gets lost.  </a:t>
+            </a:r>
+          </a:p>
+        </p:txBody>
+      </p:sp>
+      <p:sp>
+        <p:nvSpPr>
+          <p:cNvPr id="4" name="Slide Number Placeholder 3">
+            <a:extLst>
+              <a:ext uri="{FF2B5EF4-FFF2-40B4-BE49-F238E27FC236}">
+                <a16:creationId xmlns:a16="http://schemas.microsoft.com/office/drawing/2014/main" id="{07597DCD-8735-534B-AF25-7D8D97DC91A9}"/>
+              </a:ext>
+            </a:extLst>
+          </p:cNvPr>
+          <p:cNvSpPr>
+            <a:spLocks noGrp="1"/>
+          </p:cNvSpPr>
+          <p:nvPr>
+            <p:ph type="sldNum" sz="quarter" idx="12"/>
+          </p:nvPr>
+        </p:nvSpPr>
+        <p:spPr/>
+        <p:txBody>
+          <a:bodyPr/>
+          <a:lstStyle/>
+          <a:p>
+            <a:fld id="{934C0642-4071-7D48-AFF8-BD27182896CC}" type="slidenum">
+              <a:rPr lang="en-US" smtClean="0"/>
+              <a:t>14</a:t>
+            </a:fld>
+            <a:endParaRPr lang="en-US"/>
+          </a:p>
+        </p:txBody>
+      </p:sp>
+    </p:spTree>
+    <p:extLst>
+      <p:ext uri="{BB962C8B-B14F-4D97-AF65-F5344CB8AC3E}">
+        <p14:creationId xmlns:p14="http://schemas.microsoft.com/office/powerpoint/2010/main" val="1247774137"/>
+      </p:ext>
+    </p:extLst>
+  </p:cSld>
+  <p:clrMapOvr>
+    <a:masterClrMapping/>
+  </p:clrMapOvr>
+</p:sld>
+</file>
+
+<file path=ppt/slides/slide15.xml><?xml version="1.0" encoding="utf-8"?>
+<p:sld xmlns:a="http://schemas.openxmlformats.org/drawingml/2006/main" xmlns:r="http://schemas.openxmlformats.org/officeDocument/2006/relationships" xmlns:p="http://schemas.openxmlformats.org/presentationml/2006/main">
+  <p:cSld>
+    <p:spTree>
+      <p:nvGrpSpPr>
+        <p:cNvPr id="1" name=""/>
+        <p:cNvGrpSpPr/>
+        <p:nvPr/>
+      </p:nvGrpSpPr>
+      <p:grpSpPr>
+        <a:xfrm>
+          <a:off x="0" y="0"/>
+          <a:ext cx="0" cy="0"/>
+          <a:chOff x="0" y="0"/>
+          <a:chExt cx="0" cy="0"/>
+        </a:xfrm>
+      </p:grpSpPr>
+      <p:sp>
+        <p:nvSpPr>
+          <p:cNvPr id="2" name="Title 1">
+            <a:extLst>
+              <a:ext uri="{FF2B5EF4-FFF2-40B4-BE49-F238E27FC236}">
+                <a16:creationId xmlns:a16="http://schemas.microsoft.com/office/drawing/2014/main" id="{EC9F9301-055B-D74D-B420-C90EB94E8AFF}"/>
+              </a:ext>
+            </a:extLst>
+          </p:cNvPr>
+          <p:cNvSpPr>
+            <a:spLocks noGrp="1"/>
+          </p:cNvSpPr>
+          <p:nvPr>
+            <p:ph type="title"/>
+          </p:nvPr>
+        </p:nvSpPr>
+        <p:spPr/>
+        <p:txBody>
+          <a:bodyPr>
+            <a:normAutofit/>
+          </a:bodyPr>
+          <a:lstStyle/>
+          <a:p>
+            <a:r>
+              <a:rPr lang="en-US" dirty="0"/>
+              <a:t>As we proceed, let’s play with the </a:t>
+            </a:r>
+            <a:r>
+              <a:rPr lang="en-US" dirty="0" err="1"/>
+              <a:t>PurpleAir</a:t>
+            </a:r>
+            <a:r>
+              <a:rPr lang="en-US" dirty="0"/>
+              <a:t> data set.  </a:t>
+            </a:r>
+          </a:p>
+        </p:txBody>
+      </p:sp>
+      <p:sp>
+        <p:nvSpPr>
+          <p:cNvPr id="3" name="Content Placeholder 2">
+            <a:extLst>
+              <a:ext uri="{FF2B5EF4-FFF2-40B4-BE49-F238E27FC236}">
+                <a16:creationId xmlns:a16="http://schemas.microsoft.com/office/drawing/2014/main" id="{E2401AB3-8E8E-2A41-9AB9-DE0A5E002718}"/>
+              </a:ext>
+            </a:extLst>
+          </p:cNvPr>
+          <p:cNvSpPr>
+            <a:spLocks noGrp="1"/>
+          </p:cNvSpPr>
+          <p:nvPr>
+            <p:ph idx="1"/>
+          </p:nvPr>
+        </p:nvSpPr>
+        <p:spPr>
+          <a:xfrm>
+            <a:off x="511233" y="1847850"/>
+            <a:ext cx="5957587" cy="4351338"/>
+          </a:xfrm>
+        </p:spPr>
+        <p:txBody>
+          <a:bodyPr>
+            <a:normAutofit/>
+          </a:bodyPr>
+          <a:lstStyle/>
+          <a:p>
+            <a:pPr marL="0" indent="0">
+              <a:buNone/>
+            </a:pPr>
+            <a:r>
+              <a:rPr lang="en-US" sz="3200" dirty="0"/>
+              <a:t>First, a little more on PM.  S</a:t>
+            </a:r>
+            <a:r>
+              <a:rPr lang="en-US" dirty="0"/>
+              <a:t>ources:</a:t>
+            </a:r>
+          </a:p>
+          <a:p>
+            <a:pPr lvl="1"/>
+            <a:r>
+              <a:rPr lang="en-US" dirty="0"/>
+              <a:t>Many sizes and shapes and can be made up of hundreds of different chemicals.</a:t>
+            </a:r>
+          </a:p>
+          <a:p>
+            <a:pPr lvl="1"/>
+            <a:r>
+              <a:rPr lang="en-US" dirty="0"/>
+              <a:t>Some directly from a source: construction sites, unpaved roads, fields, smokestacks or fires.</a:t>
+            </a:r>
+          </a:p>
+          <a:p>
+            <a:pPr lvl="1"/>
+            <a:r>
+              <a:rPr lang="en-US" dirty="0"/>
+              <a:t>Most form in the atmosphere by complex reactions of chemicals such as sulfur dioxide and nitrogen oxides</a:t>
+            </a:r>
+          </a:p>
+        </p:txBody>
+      </p:sp>
+      <p:sp>
+        <p:nvSpPr>
+          <p:cNvPr id="4" name="Slide Number Placeholder 3">
+            <a:extLst>
+              <a:ext uri="{FF2B5EF4-FFF2-40B4-BE49-F238E27FC236}">
+                <a16:creationId xmlns:a16="http://schemas.microsoft.com/office/drawing/2014/main" id="{7847ABF5-9B1D-DF4F-9DA4-D0F6B6B72057}"/>
+              </a:ext>
+            </a:extLst>
+          </p:cNvPr>
+          <p:cNvSpPr>
+            <a:spLocks noGrp="1"/>
+          </p:cNvSpPr>
+          <p:nvPr>
+            <p:ph type="sldNum" sz="quarter" idx="12"/>
+          </p:nvPr>
+        </p:nvSpPr>
+        <p:spPr/>
+        <p:txBody>
+          <a:bodyPr/>
+          <a:lstStyle/>
+          <a:p>
+            <a:fld id="{934C0642-4071-7D48-AFF8-BD27182896CC}" type="slidenum">
+              <a:rPr lang="en-US" smtClean="0"/>
+              <a:t>15</a:t>
+            </a:fld>
+            <a:endParaRPr lang="en-US"/>
+          </a:p>
+        </p:txBody>
+      </p:sp>
+      <p:pic>
+        <p:nvPicPr>
+          <p:cNvPr id="5" name="Picture 4">
+            <a:extLst>
+              <a:ext uri="{FF2B5EF4-FFF2-40B4-BE49-F238E27FC236}">
+                <a16:creationId xmlns:a16="http://schemas.microsoft.com/office/drawing/2014/main" id="{690B2D8D-1887-C149-8B9D-CEC9971D8F58}"/>
+              </a:ext>
+            </a:extLst>
+          </p:cNvPr>
+          <p:cNvPicPr>
+            <a:picLocks noChangeAspect="1"/>
+          </p:cNvPicPr>
+          <p:nvPr/>
+        </p:nvPicPr>
+        <p:blipFill>
+          <a:blip r:embed="rId2"/>
+          <a:stretch>
+            <a:fillRect/>
+          </a:stretch>
+        </p:blipFill>
+        <p:spPr>
+          <a:xfrm>
+            <a:off x="6468820" y="2086769"/>
+            <a:ext cx="5561949" cy="3873500"/>
+          </a:xfrm>
+          <a:prstGeom prst="rect">
+            <a:avLst/>
+          </a:prstGeom>
+        </p:spPr>
+      </p:pic>
+    </p:spTree>
+    <p:extLst>
+      <p:ext uri="{BB962C8B-B14F-4D97-AF65-F5344CB8AC3E}">
+        <p14:creationId xmlns:p14="http://schemas.microsoft.com/office/powerpoint/2010/main" val="3126903609"/>
+      </p:ext>
+    </p:extLst>
+  </p:cSld>
+  <p:clrMapOvr>
+    <a:masterClrMapping/>
+  </p:clrMapOvr>
+</p:sld>
+</file>
+
+<file path=ppt/slides/slide16.xml><?xml version="1.0" encoding="utf-8"?>
+<p:sld xmlns:a="http://schemas.openxmlformats.org/drawingml/2006/main" xmlns:r="http://schemas.openxmlformats.org/officeDocument/2006/relationships" xmlns:p="http://schemas.openxmlformats.org/presentationml/2006/main">
+  <p:cSld>
+    <p:spTree>
+      <p:nvGrpSpPr>
+        <p:cNvPr id="1" name=""/>
+        <p:cNvGrpSpPr/>
+        <p:nvPr/>
+      </p:nvGrpSpPr>
+      <p:grpSpPr>
+        <a:xfrm>
+          <a:off x="0" y="0"/>
+          <a:ext cx="0" cy="0"/>
+          <a:chOff x="0" y="0"/>
+          <a:chExt cx="0" cy="0"/>
+        </a:xfrm>
+      </p:grpSpPr>
+      <p:sp>
+        <p:nvSpPr>
+          <p:cNvPr id="2" name="Title 1">
+            <a:extLst>
+              <a:ext uri="{FF2B5EF4-FFF2-40B4-BE49-F238E27FC236}">
+                <a16:creationId xmlns:a16="http://schemas.microsoft.com/office/drawing/2014/main" id="{77BAC7B4-B79E-874C-905F-9BAC5B7C02B1}"/>
+              </a:ext>
+            </a:extLst>
+          </p:cNvPr>
+          <p:cNvSpPr>
+            <a:spLocks noGrp="1"/>
+          </p:cNvSpPr>
+          <p:nvPr>
+            <p:ph type="title"/>
+          </p:nvPr>
+        </p:nvSpPr>
+        <p:spPr/>
+        <p:txBody>
+          <a:bodyPr/>
+          <a:lstStyle/>
+          <a:p>
+            <a:r>
+              <a:rPr lang="en-US" dirty="0"/>
+              <a:t>More on PM2.5…</a:t>
+            </a:r>
+          </a:p>
+        </p:txBody>
+      </p:sp>
+      <p:sp>
+        <p:nvSpPr>
+          <p:cNvPr id="3" name="Content Placeholder 2">
+            <a:extLst>
+              <a:ext uri="{FF2B5EF4-FFF2-40B4-BE49-F238E27FC236}">
+                <a16:creationId xmlns:a16="http://schemas.microsoft.com/office/drawing/2014/main" id="{86A20542-5AF8-774B-85C3-6135461A6E60}"/>
+              </a:ext>
+            </a:extLst>
+          </p:cNvPr>
+          <p:cNvSpPr>
+            <a:spLocks noGrp="1"/>
+          </p:cNvSpPr>
+          <p:nvPr>
+            <p:ph idx="1"/>
+          </p:nvPr>
+        </p:nvSpPr>
+        <p:spPr>
+          <a:xfrm>
+            <a:off x="838200" y="1460500"/>
+            <a:ext cx="10515600" cy="5092699"/>
+          </a:xfrm>
+        </p:spPr>
+        <p:txBody>
+          <a:bodyPr>
+            <a:normAutofit fontScale="92500" lnSpcReduction="10000"/>
+          </a:bodyPr>
+          <a:lstStyle/>
+          <a:p>
+            <a:r>
+              <a:rPr lang="en-US" dirty="0"/>
+              <a:t>(text adapted from </a:t>
+            </a:r>
+            <a:r>
+              <a:rPr lang="en-US" dirty="0" err="1"/>
+              <a:t>epa.gov</a:t>
+            </a:r>
+            <a:r>
+              <a:rPr lang="en-US" dirty="0"/>
+              <a:t>) Health effects:</a:t>
+            </a:r>
+          </a:p>
+          <a:p>
+            <a:pPr lvl="1"/>
+            <a:r>
+              <a:rPr lang="en-US" dirty="0"/>
+              <a:t>premature death in people with heart or lung disease</a:t>
+            </a:r>
+          </a:p>
+          <a:p>
+            <a:pPr lvl="1"/>
+            <a:r>
+              <a:rPr lang="en-US" dirty="0"/>
+              <a:t>nonfatal heart attacks</a:t>
+            </a:r>
+          </a:p>
+          <a:p>
+            <a:pPr lvl="1"/>
+            <a:r>
+              <a:rPr lang="en-US" dirty="0"/>
+              <a:t>irregular heartbeat</a:t>
+            </a:r>
+          </a:p>
+          <a:p>
+            <a:pPr lvl="1"/>
+            <a:r>
+              <a:rPr lang="en-US" dirty="0"/>
+              <a:t>aggravated asthma</a:t>
+            </a:r>
+          </a:p>
+          <a:p>
+            <a:pPr lvl="1"/>
+            <a:r>
+              <a:rPr lang="en-US" dirty="0"/>
+              <a:t>decreased lung function</a:t>
+            </a:r>
+          </a:p>
+          <a:p>
+            <a:pPr lvl="1"/>
+            <a:r>
+              <a:rPr lang="en-US" dirty="0"/>
+              <a:t>increased respiratory symptoms, such as irritation of the airways</a:t>
+            </a:r>
+          </a:p>
+          <a:p>
+            <a:r>
+              <a:rPr lang="en-US" dirty="0"/>
+              <a:t>Environmental effects</a:t>
+            </a:r>
+          </a:p>
+          <a:p>
+            <a:pPr lvl="1"/>
+            <a:r>
+              <a:rPr lang="en-US" dirty="0"/>
+              <a:t>makes lakes and streams acidic</a:t>
+            </a:r>
+          </a:p>
+          <a:p>
+            <a:pPr lvl="1"/>
+            <a:r>
+              <a:rPr lang="en-US" dirty="0"/>
+              <a:t>changes the nutrient balance in coastal waters and large river basins</a:t>
+            </a:r>
+          </a:p>
+          <a:p>
+            <a:pPr lvl="1"/>
+            <a:r>
+              <a:rPr lang="en-US" dirty="0"/>
+              <a:t>depletes soil nutrients</a:t>
+            </a:r>
+          </a:p>
+          <a:p>
+            <a:pPr lvl="1"/>
+            <a:r>
+              <a:rPr lang="en-US" dirty="0"/>
+              <a:t>damages sensitive forests and farm crops</a:t>
+            </a:r>
+          </a:p>
+          <a:p>
+            <a:pPr lvl="1"/>
+            <a:r>
+              <a:rPr lang="en-US" dirty="0"/>
+              <a:t>affects the diversity of ecosystems</a:t>
+            </a:r>
+          </a:p>
+          <a:p>
+            <a:pPr lvl="1"/>
+            <a:r>
+              <a:rPr lang="en-US" dirty="0"/>
+              <a:t>contributes to acid rain</a:t>
+            </a:r>
+          </a:p>
+        </p:txBody>
+      </p:sp>
+      <p:sp>
+        <p:nvSpPr>
+          <p:cNvPr id="4" name="Slide Number Placeholder 3">
+            <a:extLst>
+              <a:ext uri="{FF2B5EF4-FFF2-40B4-BE49-F238E27FC236}">
+                <a16:creationId xmlns:a16="http://schemas.microsoft.com/office/drawing/2014/main" id="{5C50DC2E-8D1A-F94F-B9E2-EC7F64466A95}"/>
+              </a:ext>
+            </a:extLst>
+          </p:cNvPr>
+          <p:cNvSpPr>
+            <a:spLocks noGrp="1"/>
+          </p:cNvSpPr>
+          <p:nvPr>
+            <p:ph type="sldNum" sz="quarter" idx="12"/>
+          </p:nvPr>
+        </p:nvSpPr>
+        <p:spPr/>
+        <p:txBody>
+          <a:bodyPr/>
+          <a:lstStyle/>
+          <a:p>
+            <a:fld id="{934C0642-4071-7D48-AFF8-BD27182896CC}" type="slidenum">
+              <a:rPr lang="en-US" smtClean="0"/>
+              <a:t>16</a:t>
+            </a:fld>
+            <a:endParaRPr lang="en-US"/>
+          </a:p>
+        </p:txBody>
+      </p:sp>
+    </p:spTree>
+    <p:extLst>
+      <p:ext uri="{BB962C8B-B14F-4D97-AF65-F5344CB8AC3E}">
+        <p14:creationId xmlns:p14="http://schemas.microsoft.com/office/powerpoint/2010/main" val="4005058995"/>
+      </p:ext>
+    </p:extLst>
+  </p:cSld>
+  <p:clrMapOvr>
+    <a:masterClrMapping/>
+  </p:clrMapOvr>
+</p:sld>
+</file>
+
+<file path=ppt/slides/slide17.xml><?xml version="1.0" encoding="utf-8"?>
+<p:sld xmlns:a="http://schemas.openxmlformats.org/drawingml/2006/main" xmlns:r="http://schemas.openxmlformats.org/officeDocument/2006/relationships" xmlns:p="http://schemas.openxmlformats.org/presentationml/2006/main">
+  <p:cSld>
+    <p:spTree>
+      <p:nvGrpSpPr>
+        <p:cNvPr id="1" name=""/>
+        <p:cNvGrpSpPr/>
+        <p:nvPr/>
+      </p:nvGrpSpPr>
+      <p:grpSpPr>
+        <a:xfrm>
+          <a:off x="0" y="0"/>
+          <a:ext cx="0" cy="0"/>
+          <a:chOff x="0" y="0"/>
+          <a:chExt cx="0" cy="0"/>
+        </a:xfrm>
+      </p:grpSpPr>
+      <p:sp>
+        <p:nvSpPr>
+          <p:cNvPr id="2" name="Title 1">
+            <a:extLst>
+              <a:ext uri="{FF2B5EF4-FFF2-40B4-BE49-F238E27FC236}">
+                <a16:creationId xmlns:a16="http://schemas.microsoft.com/office/drawing/2014/main" id="{46F115E8-5508-D045-9890-A3845A84524C}"/>
+              </a:ext>
+            </a:extLst>
+          </p:cNvPr>
+          <p:cNvSpPr>
+            <a:spLocks noGrp="1"/>
+          </p:cNvSpPr>
+          <p:nvPr>
+            <p:ph type="title"/>
+          </p:nvPr>
+        </p:nvSpPr>
+        <p:spPr/>
+        <p:txBody>
+          <a:bodyPr/>
+          <a:lstStyle/>
+          <a:p>
+            <a:r>
+              <a:rPr lang="en-US" dirty="0"/>
+              <a:t>Exploratory Data Analysis (EDA)</a:t>
+            </a:r>
+          </a:p>
+        </p:txBody>
+      </p:sp>
+      <p:sp>
+        <p:nvSpPr>
+          <p:cNvPr id="3" name="Content Placeholder 2">
+            <a:extLst>
+              <a:ext uri="{FF2B5EF4-FFF2-40B4-BE49-F238E27FC236}">
+                <a16:creationId xmlns:a16="http://schemas.microsoft.com/office/drawing/2014/main" id="{AEA37523-53AF-FE4F-A620-A4251A6EE2A9}"/>
+              </a:ext>
+            </a:extLst>
+          </p:cNvPr>
+          <p:cNvSpPr>
+            <a:spLocks noGrp="1"/>
+          </p:cNvSpPr>
+          <p:nvPr>
+            <p:ph idx="1"/>
+          </p:nvPr>
+        </p:nvSpPr>
+        <p:spPr/>
+        <p:txBody>
+          <a:bodyPr/>
+          <a:lstStyle/>
+          <a:p>
+            <a:pPr marL="0" indent="0">
+              <a:buNone/>
+            </a:pPr>
+            <a:r>
+              <a:rPr lang="en-US" dirty="0"/>
+              <a:t>One can approach EDA by asking questions about the data:</a:t>
+            </a:r>
+          </a:p>
+          <a:p>
+            <a:r>
+              <a:rPr lang="en-US" dirty="0"/>
+              <a:t>Structure</a:t>
+            </a:r>
+          </a:p>
+          <a:p>
+            <a:r>
+              <a:rPr lang="en-US" dirty="0"/>
+              <a:t>Granularity</a:t>
+            </a:r>
+          </a:p>
+          <a:p>
+            <a:r>
+              <a:rPr lang="en-US" dirty="0"/>
+              <a:t>Scope</a:t>
+            </a:r>
+          </a:p>
+          <a:p>
+            <a:r>
+              <a:rPr lang="en-US" dirty="0"/>
+              <a:t>Temporality</a:t>
+            </a:r>
+          </a:p>
+          <a:p>
+            <a:r>
+              <a:rPr lang="en-US" dirty="0"/>
+              <a:t>Faithfulness</a:t>
+            </a:r>
+          </a:p>
+        </p:txBody>
+      </p:sp>
+      <p:sp>
+        <p:nvSpPr>
+          <p:cNvPr id="4" name="Slide Number Placeholder 3">
+            <a:extLst>
+              <a:ext uri="{FF2B5EF4-FFF2-40B4-BE49-F238E27FC236}">
+                <a16:creationId xmlns:a16="http://schemas.microsoft.com/office/drawing/2014/main" id="{F44EE564-C00E-7A42-B959-54073575C4B3}"/>
+              </a:ext>
+            </a:extLst>
+          </p:cNvPr>
+          <p:cNvSpPr>
+            <a:spLocks noGrp="1"/>
+          </p:cNvSpPr>
+          <p:nvPr>
+            <p:ph type="sldNum" sz="quarter" idx="12"/>
+          </p:nvPr>
+        </p:nvSpPr>
+        <p:spPr/>
+        <p:txBody>
+          <a:bodyPr/>
+          <a:lstStyle/>
+          <a:p>
+            <a:fld id="{934C0642-4071-7D48-AFF8-BD27182896CC}" type="slidenum">
+              <a:rPr lang="en-US" smtClean="0"/>
+              <a:t>17</a:t>
+            </a:fld>
+            <a:endParaRPr lang="en-US"/>
+          </a:p>
+        </p:txBody>
+      </p:sp>
+    </p:spTree>
+    <p:extLst>
+      <p:ext uri="{BB962C8B-B14F-4D97-AF65-F5344CB8AC3E}">
+        <p14:creationId xmlns:p14="http://schemas.microsoft.com/office/powerpoint/2010/main" val="591534505"/>
+      </p:ext>
+    </p:extLst>
+  </p:cSld>
+  <p:clrMapOvr>
+    <a:masterClrMapping/>
+  </p:clrMapOvr>
+</p:sld>
+</file>
+
+<file path=ppt/slides/slide18.xml><?xml version="1.0" encoding="utf-8"?>
+<p:sld xmlns:a="http://schemas.openxmlformats.org/drawingml/2006/main" xmlns:r="http://schemas.openxmlformats.org/officeDocument/2006/relationships" xmlns:p="http://schemas.openxmlformats.org/presentationml/2006/main">
+  <p:cSld>
+    <p:spTree>
+      <p:nvGrpSpPr>
+        <p:cNvPr id="1" name=""/>
+        <p:cNvGrpSpPr/>
+        <p:nvPr/>
+      </p:nvGrpSpPr>
+      <p:grpSpPr>
+        <a:xfrm>
+          <a:off x="0" y="0"/>
+          <a:ext cx="0" cy="0"/>
+          <a:chOff x="0" y="0"/>
+          <a:chExt cx="0" cy="0"/>
+        </a:xfrm>
+      </p:grpSpPr>
+      <p:sp>
+        <p:nvSpPr>
+          <p:cNvPr id="2" name="Title 1">
+            <a:extLst>
+              <a:ext uri="{FF2B5EF4-FFF2-40B4-BE49-F238E27FC236}">
+                <a16:creationId xmlns:a16="http://schemas.microsoft.com/office/drawing/2014/main" id="{3F15EF94-753F-3948-B515-BEFC41583160}"/>
+              </a:ext>
+            </a:extLst>
+          </p:cNvPr>
+          <p:cNvSpPr>
+            <a:spLocks noGrp="1"/>
+          </p:cNvSpPr>
+          <p:nvPr>
+            <p:ph type="title"/>
+          </p:nvPr>
+        </p:nvSpPr>
+        <p:spPr/>
+        <p:txBody>
+          <a:bodyPr/>
+          <a:lstStyle/>
+          <a:p>
+            <a:r>
+              <a:rPr lang="en-US" dirty="0"/>
+              <a:t>Structure – how are the data stored?</a:t>
+            </a:r>
+          </a:p>
+        </p:txBody>
+      </p:sp>
+      <p:sp>
+        <p:nvSpPr>
+          <p:cNvPr id="3" name="Content Placeholder 2">
+            <a:extLst>
+              <a:ext uri="{FF2B5EF4-FFF2-40B4-BE49-F238E27FC236}">
+                <a16:creationId xmlns:a16="http://schemas.microsoft.com/office/drawing/2014/main" id="{B853B4C4-F8F2-CD44-ABD0-C3D92227CDDD}"/>
+              </a:ext>
+            </a:extLst>
+          </p:cNvPr>
+          <p:cNvSpPr>
+            <a:spLocks noGrp="1"/>
+          </p:cNvSpPr>
+          <p:nvPr>
+            <p:ph idx="1"/>
+          </p:nvPr>
+        </p:nvSpPr>
+        <p:spPr/>
+        <p:txBody>
+          <a:bodyPr>
+            <a:normAutofit/>
+          </a:bodyPr>
+          <a:lstStyle/>
+          <a:p>
+            <a:r>
+              <a:rPr lang="en-US" dirty="0"/>
+              <a:t>Are the data in a standard format or encoding?</a:t>
+            </a:r>
+          </a:p>
+          <a:p>
+            <a:pPr lvl="1"/>
+            <a:r>
+              <a:rPr lang="en-US" dirty="0"/>
+              <a:t>Tabular data: CSV, TSV, Excel, SQL</a:t>
+            </a:r>
+          </a:p>
+          <a:p>
+            <a:pPr lvl="1"/>
+            <a:r>
+              <a:rPr lang="en-US" dirty="0"/>
+              <a:t>Nested data: JSON, XML</a:t>
+            </a:r>
+          </a:p>
+          <a:p>
+            <a:r>
+              <a:rPr lang="en-US" dirty="0"/>
+              <a:t>Are the data organized in records (e.g. rows)? If not, can we define records by parsing the data?</a:t>
+            </a:r>
+          </a:p>
+          <a:p>
+            <a:r>
+              <a:rPr lang="en-US" dirty="0"/>
+              <a:t>Are the data nested? If so, can we reasonably un-nest the data?</a:t>
+            </a:r>
+          </a:p>
+          <a:p>
+            <a:r>
+              <a:rPr lang="en-US" dirty="0"/>
+              <a:t>Do the data reference other data? If so, can we join the data?</a:t>
+            </a:r>
+          </a:p>
+          <a:p>
+            <a:r>
+              <a:rPr lang="en-US" dirty="0"/>
+              <a:t>What are the fields (e.g. columns) in each record? What is the type of each column?</a:t>
+            </a:r>
+          </a:p>
+        </p:txBody>
+      </p:sp>
+      <p:sp>
+        <p:nvSpPr>
+          <p:cNvPr id="4" name="Slide Number Placeholder 3">
+            <a:extLst>
+              <a:ext uri="{FF2B5EF4-FFF2-40B4-BE49-F238E27FC236}">
+                <a16:creationId xmlns:a16="http://schemas.microsoft.com/office/drawing/2014/main" id="{3614E8E2-6203-C645-9E96-5772F90C990C}"/>
+              </a:ext>
+            </a:extLst>
+          </p:cNvPr>
+          <p:cNvSpPr>
+            <a:spLocks noGrp="1"/>
+          </p:cNvSpPr>
+          <p:nvPr>
+            <p:ph type="sldNum" sz="quarter" idx="12"/>
+          </p:nvPr>
+        </p:nvSpPr>
+        <p:spPr/>
+        <p:txBody>
+          <a:bodyPr/>
+          <a:lstStyle/>
+          <a:p>
+            <a:fld id="{934C0642-4071-7D48-AFF8-BD27182896CC}" type="slidenum">
+              <a:rPr lang="en-US" smtClean="0"/>
+              <a:t>18</a:t>
+            </a:fld>
+            <a:endParaRPr lang="en-US"/>
+          </a:p>
+        </p:txBody>
+      </p:sp>
+    </p:spTree>
+    <p:extLst>
+      <p:ext uri="{BB962C8B-B14F-4D97-AF65-F5344CB8AC3E}">
+        <p14:creationId xmlns:p14="http://schemas.microsoft.com/office/powerpoint/2010/main" val="2166552454"/>
+      </p:ext>
+    </p:extLst>
+  </p:cSld>
+  <p:clrMapOvr>
+    <a:masterClrMapping/>
+  </p:clrMapOvr>
+</p:sld>
+</file>
+
+<file path=ppt/slides/slide19.xml><?xml version="1.0" encoding="utf-8"?>
+<p:sld xmlns:a="http://schemas.openxmlformats.org/drawingml/2006/main" xmlns:r="http://schemas.openxmlformats.org/officeDocument/2006/relationships" xmlns:p="http://schemas.openxmlformats.org/presentationml/2006/main">
+  <p:cSld>
+    <p:spTree>
+      <p:nvGrpSpPr>
+        <p:cNvPr id="1" name=""/>
+        <p:cNvGrpSpPr/>
+        <p:nvPr/>
+      </p:nvGrpSpPr>
+      <p:grpSpPr>
+        <a:xfrm>
+          <a:off x="0" y="0"/>
+          <a:ext cx="0" cy="0"/>
+          <a:chOff x="0" y="0"/>
+          <a:chExt cx="0" cy="0"/>
+        </a:xfrm>
+      </p:grpSpPr>
+      <p:sp>
+        <p:nvSpPr>
           <p:cNvPr id="4" name="Title 3">
             <a:extLst>
               <a:ext uri="{FF2B5EF4-FFF2-40B4-BE49-F238E27FC236}">
@@ -4292,7 +5974,7 @@
           <a:p>
             <a:fld id="{934C0642-4071-7D48-AFF8-BD27182896CC}" type="slidenum">
               <a:rPr lang="en-US" smtClean="0"/>
-              <a:t>10</a:t>
+              <a:t>19</a:t>
             </a:fld>
             <a:endParaRPr lang="en-US"/>
           </a:p>
@@ -4559,7 +6241,162 @@
 </p:sld>
 </file>
 
-<file path=ppt/slides/slide11.xml><?xml version="1.0" encoding="utf-8"?>
+<file path=ppt/slides/slide2.xml><?xml version="1.0" encoding="utf-8"?>
+<p:sld xmlns:a="http://schemas.openxmlformats.org/drawingml/2006/main" xmlns:r="http://schemas.openxmlformats.org/officeDocument/2006/relationships" xmlns:p="http://schemas.openxmlformats.org/presentationml/2006/main">
+  <p:cSld>
+    <p:spTree>
+      <p:nvGrpSpPr>
+        <p:cNvPr id="1" name=""/>
+        <p:cNvGrpSpPr/>
+        <p:nvPr/>
+      </p:nvGrpSpPr>
+      <p:grpSpPr>
+        <a:xfrm>
+          <a:off x="0" y="0"/>
+          <a:ext cx="0" cy="0"/>
+          <a:chOff x="0" y="0"/>
+          <a:chExt cx="0" cy="0"/>
+        </a:xfrm>
+      </p:grpSpPr>
+      <p:pic>
+        <p:nvPicPr>
+          <p:cNvPr id="7" name="Picture 6">
+            <a:extLst>
+              <a:ext uri="{FF2B5EF4-FFF2-40B4-BE49-F238E27FC236}">
+                <a16:creationId xmlns:a16="http://schemas.microsoft.com/office/drawing/2014/main" id="{C76D1CCC-F6DF-DF41-B027-D29D5E5B592B}"/>
+              </a:ext>
+            </a:extLst>
+          </p:cNvPr>
+          <p:cNvPicPr>
+            <a:picLocks noChangeAspect="1"/>
+          </p:cNvPicPr>
+          <p:nvPr/>
+        </p:nvPicPr>
+        <p:blipFill>
+          <a:blip r:embed="rId2"/>
+          <a:stretch>
+            <a:fillRect/>
+          </a:stretch>
+        </p:blipFill>
+        <p:spPr>
+          <a:xfrm>
+            <a:off x="643965" y="836722"/>
+            <a:ext cx="8697259" cy="5617959"/>
+          </a:xfrm>
+          <a:prstGeom prst="rect">
+            <a:avLst/>
+          </a:prstGeom>
+        </p:spPr>
+      </p:pic>
+      <p:sp>
+        <p:nvSpPr>
+          <p:cNvPr id="2" name="Title 1">
+            <a:extLst>
+              <a:ext uri="{FF2B5EF4-FFF2-40B4-BE49-F238E27FC236}">
+                <a16:creationId xmlns:a16="http://schemas.microsoft.com/office/drawing/2014/main" id="{33825DE9-BCB8-3F49-9C79-A64A29C1A301}"/>
+              </a:ext>
+            </a:extLst>
+          </p:cNvPr>
+          <p:cNvSpPr>
+            <a:spLocks noGrp="1"/>
+          </p:cNvSpPr>
+          <p:nvPr>
+            <p:ph type="title"/>
+          </p:nvPr>
+        </p:nvSpPr>
+        <p:spPr>
+          <a:xfrm>
+            <a:off x="5307106" y="365125"/>
+            <a:ext cx="6046694" cy="1325563"/>
+          </a:xfrm>
+        </p:spPr>
+        <p:txBody>
+          <a:bodyPr/>
+          <a:lstStyle/>
+          <a:p>
+            <a:r>
+              <a:rPr lang="en-US" dirty="0"/>
+              <a:t>Seminar tomorrow, 88 </a:t>
+            </a:r>
+            <a:r>
+              <a:rPr lang="en-US" dirty="0" err="1"/>
+              <a:t>Dwinelle</a:t>
+            </a:r>
+            <a:r>
+              <a:rPr lang="en-US" dirty="0"/>
+              <a:t>, 12:10-1:30</a:t>
+            </a:r>
+          </a:p>
+        </p:txBody>
+      </p:sp>
+      <p:sp>
+        <p:nvSpPr>
+          <p:cNvPr id="3" name="Content Placeholder 2">
+            <a:extLst>
+              <a:ext uri="{FF2B5EF4-FFF2-40B4-BE49-F238E27FC236}">
+                <a16:creationId xmlns:a16="http://schemas.microsoft.com/office/drawing/2014/main" id="{E7BE8B0D-FAF9-6749-893E-A7D160FAF461}"/>
+              </a:ext>
+            </a:extLst>
+          </p:cNvPr>
+          <p:cNvSpPr>
+            <a:spLocks noGrp="1"/>
+          </p:cNvSpPr>
+          <p:nvPr>
+            <p:ph idx="1"/>
+          </p:nvPr>
+        </p:nvSpPr>
+        <p:spPr/>
+        <p:txBody>
+          <a:bodyPr/>
+          <a:lstStyle/>
+          <a:p>
+            <a:endParaRPr lang="en-US"/>
+          </a:p>
+        </p:txBody>
+      </p:sp>
+      <p:sp>
+        <p:nvSpPr>
+          <p:cNvPr id="4" name="Slide Number Placeholder 3">
+            <a:extLst>
+              <a:ext uri="{FF2B5EF4-FFF2-40B4-BE49-F238E27FC236}">
+                <a16:creationId xmlns:a16="http://schemas.microsoft.com/office/drawing/2014/main" id="{033CEC1C-F016-5141-976A-993E6A8CD7A7}"/>
+              </a:ext>
+            </a:extLst>
+          </p:cNvPr>
+          <p:cNvSpPr>
+            <a:spLocks noGrp="1"/>
+          </p:cNvSpPr>
+          <p:nvPr>
+            <p:ph type="sldNum" sz="quarter" idx="12"/>
+          </p:nvPr>
+        </p:nvSpPr>
+        <p:spPr/>
+        <p:txBody>
+          <a:bodyPr/>
+          <a:lstStyle/>
+          <a:p>
+            <a:fld id="{934C0642-4071-7D48-AFF8-BD27182896CC}" type="slidenum">
+              <a:rPr lang="en-US" smtClean="0"/>
+              <a:t>2</a:t>
+            </a:fld>
+            <a:endParaRPr lang="en-US"/>
+          </a:p>
+        </p:txBody>
+      </p:sp>
+    </p:spTree>
+    <p:extLst>
+      <p:ext uri="{BB962C8B-B14F-4D97-AF65-F5344CB8AC3E}">
+        <p14:creationId xmlns:p14="http://schemas.microsoft.com/office/powerpoint/2010/main" val="3372390383"/>
+      </p:ext>
+    </p:extLst>
+  </p:cSld>
+  <p:clrMapOvr>
+    <a:masterClrMapping/>
+  </p:clrMapOvr>
+</p:sld>
+</file>
+
+<file path=ppt/slides/slide20.xml><?xml version="1.0" encoding="utf-8"?>
 <p:sld xmlns:a="http://schemas.openxmlformats.org/drawingml/2006/main" xmlns:r="http://schemas.openxmlformats.org/officeDocument/2006/relationships" xmlns:p="http://schemas.openxmlformats.org/presentationml/2006/main">
   <p:cSld>
     <p:spTree>
@@ -4813,7 +6650,7 @@
           <a:p>
             <a:fld id="{934C0642-4071-7D48-AFF8-BD27182896CC}" type="slidenum">
               <a:rPr lang="en-US" smtClean="0"/>
-              <a:t>11</a:t>
+              <a:t>20</a:t>
             </a:fld>
             <a:endParaRPr lang="en-US"/>
           </a:p>
@@ -5243,7 +7080,7 @@
 </p:sld>
 </file>
 
-<file path=ppt/slides/slide12.xml><?xml version="1.0" encoding="utf-8"?>
+<file path=ppt/slides/slide21.xml><?xml version="1.0" encoding="utf-8"?>
 <p:sld xmlns:a="http://schemas.openxmlformats.org/drawingml/2006/main" xmlns:r="http://schemas.openxmlformats.org/officeDocument/2006/relationships" xmlns:p="http://schemas.openxmlformats.org/presentationml/2006/main">
   <p:cSld>
     <p:spTree>
@@ -5420,7 +7257,7 @@
           <a:p>
             <a:fld id="{934C0642-4071-7D48-AFF8-BD27182896CC}" type="slidenum">
               <a:rPr lang="en-US" smtClean="0"/>
-              <a:t>12</a:t>
+              <a:t>21</a:t>
             </a:fld>
             <a:endParaRPr lang="en-US"/>
           </a:p>
@@ -5716,7 +7553,7 @@
 </p:sld>
 </file>
 
-<file path=ppt/slides/slide13.xml><?xml version="1.0" encoding="utf-8"?>
+<file path=ppt/slides/slide22.xml><?xml version="1.0" encoding="utf-8"?>
 <p:sld xmlns:a="http://schemas.openxmlformats.org/drawingml/2006/main" xmlns:r="http://schemas.openxmlformats.org/officeDocument/2006/relationships" xmlns:p="http://schemas.openxmlformats.org/presentationml/2006/main">
   <p:cSld>
     <p:spTree>
@@ -5918,7 +7755,7 @@
           <a:p>
             <a:fld id="{934C0642-4071-7D48-AFF8-BD27182896CC}" type="slidenum">
               <a:rPr lang="en-US" smtClean="0"/>
-              <a:t>13</a:t>
+              <a:t>22</a:t>
             </a:fld>
             <a:endParaRPr lang="en-US"/>
           </a:p>
@@ -6397,7 +8234,7 @@
 </p:sld>
 </file>
 
-<file path=ppt/slides/slide14.xml><?xml version="1.0" encoding="utf-8"?>
+<file path=ppt/slides/slide23.xml><?xml version="1.0" encoding="utf-8"?>
 <p:sld xmlns:a="http://schemas.openxmlformats.org/drawingml/2006/main" xmlns:r="http://schemas.openxmlformats.org/officeDocument/2006/relationships" xmlns:p="http://schemas.openxmlformats.org/presentationml/2006/main">
   <p:cSld>
     <p:spTree>
@@ -6572,7 +8409,7 @@
           <a:p>
             <a:fld id="{934C0642-4071-7D48-AFF8-BD27182896CC}" type="slidenum">
               <a:rPr lang="en-US" smtClean="0"/>
-              <a:t>14</a:t>
+              <a:t>23</a:t>
             </a:fld>
             <a:endParaRPr lang="en-US"/>
           </a:p>
@@ -7212,7 +9049,7 @@
 </p:sld>
 </file>
 
-<file path=ppt/slides/slide15.xml><?xml version="1.0" encoding="utf-8"?>
+<file path=ppt/slides/slide24.xml><?xml version="1.0" encoding="utf-8"?>
 <p:sld xmlns:a="http://schemas.openxmlformats.org/drawingml/2006/main" xmlns:r="http://schemas.openxmlformats.org/officeDocument/2006/relationships" xmlns:p="http://schemas.openxmlformats.org/presentationml/2006/main">
   <p:cSld>
     <p:spTree>
@@ -7349,7 +9186,7 @@
           <a:p>
             <a:fld id="{934C0642-4071-7D48-AFF8-BD27182896CC}" type="slidenum">
               <a:rPr lang="en-US" smtClean="0"/>
-              <a:t>15</a:t>
+              <a:t>24</a:t>
             </a:fld>
             <a:endParaRPr lang="en-US"/>
           </a:p>
@@ -7368,7 +9205,7 @@
 </p:sld>
 </file>
 
-<file path=ppt/slides/slide16.xml><?xml version="1.0" encoding="utf-8"?>
+<file path=ppt/slides/slide25.xml><?xml version="1.0" encoding="utf-8"?>
 <p:sld xmlns:a="http://schemas.openxmlformats.org/drawingml/2006/main" xmlns:r="http://schemas.openxmlformats.org/officeDocument/2006/relationships" xmlns:p="http://schemas.openxmlformats.org/presentationml/2006/main">
   <p:cSld>
     <p:spTree>
@@ -7390,7 +9227,7 @@
           <p:cNvPr id="2" name="Title 1">
             <a:extLst>
               <a:ext uri="{FF2B5EF4-FFF2-40B4-BE49-F238E27FC236}">
-                <a16:creationId xmlns:a16="http://schemas.microsoft.com/office/drawing/2014/main" id="{431828DF-E3BE-6D44-AC0A-8AED086BC300}"/>
+                <a16:creationId xmlns:a16="http://schemas.microsoft.com/office/drawing/2014/main" id="{6A92403E-9D9B-4E47-9AC1-11F4288FA696}"/>
               </a:ext>
             </a:extLst>
           </p:cNvPr>
@@ -7401,62 +9238,53 @@
             <p:ph type="title"/>
           </p:nvPr>
         </p:nvSpPr>
+        <p:spPr>
+          <a:xfrm>
+            <a:off x="838200" y="2427008"/>
+            <a:ext cx="10515600" cy="1325563"/>
+          </a:xfrm>
+        </p:spPr>
+        <p:txBody>
+          <a:bodyPr/>
+          <a:lstStyle/>
+          <a:p>
+            <a:r>
+              <a:rPr lang="en-US" dirty="0"/>
+              <a:t>Lecture 6 stopped here (and covered up to Scope in the </a:t>
+            </a:r>
+            <a:r>
+              <a:rPr lang="en-US" dirty="0" err="1"/>
+              <a:t>ipynb</a:t>
+            </a:r>
+            <a:r>
+              <a:rPr lang="en-US" dirty="0"/>
+              <a:t> as well)</a:t>
+            </a:r>
+          </a:p>
+        </p:txBody>
+      </p:sp>
+      <p:sp>
+        <p:nvSpPr>
+          <p:cNvPr id="3" name="Content Placeholder 2">
+            <a:extLst>
+              <a:ext uri="{FF2B5EF4-FFF2-40B4-BE49-F238E27FC236}">
+                <a16:creationId xmlns:a16="http://schemas.microsoft.com/office/drawing/2014/main" id="{CF97C691-2D03-B443-8A13-1308530BA79C}"/>
+              </a:ext>
+            </a:extLst>
+          </p:cNvPr>
+          <p:cNvSpPr>
+            <a:spLocks noGrp="1"/>
+          </p:cNvSpPr>
+          <p:nvPr>
+            <p:ph idx="1"/>
+          </p:nvPr>
+        </p:nvSpPr>
         <p:spPr/>
         <p:txBody>
           <a:bodyPr/>
           <a:lstStyle/>
           <a:p>
-            <a:r>
-              <a:rPr lang="en-US" dirty="0"/>
-              <a:t>Temporality: How is time represented in the data?</a:t>
-            </a:r>
-          </a:p>
-        </p:txBody>
-      </p:sp>
-      <p:sp>
-        <p:nvSpPr>
-          <p:cNvPr id="3" name="Content Placeholder 2">
-            <a:extLst>
-              <a:ext uri="{FF2B5EF4-FFF2-40B4-BE49-F238E27FC236}">
-                <a16:creationId xmlns:a16="http://schemas.microsoft.com/office/drawing/2014/main" id="{B9B31E72-C639-704B-B53E-8EA1202214A5}"/>
-              </a:ext>
-            </a:extLst>
-          </p:cNvPr>
-          <p:cNvSpPr>
-            <a:spLocks noGrp="1"/>
-          </p:cNvSpPr>
-          <p:nvPr>
-            <p:ph idx="1"/>
-          </p:nvPr>
-        </p:nvSpPr>
-        <p:spPr/>
-        <p:txBody>
-          <a:bodyPr/>
-          <a:lstStyle/>
-          <a:p>
-            <a:r>
-              <a:rPr lang="en-US" dirty="0"/>
-              <a:t>What is the meaning of the date and time fields in the dataset?</a:t>
-            </a:r>
-          </a:p>
-          <a:p>
-            <a:pPr lvl="1"/>
-            <a:r>
-              <a:rPr lang="en-US" dirty="0"/>
-              <a:t>Beware of time zones, daylight savings!</a:t>
-            </a:r>
-          </a:p>
-          <a:p>
-            <a:r>
-              <a:rPr lang="en-US" dirty="0"/>
-              <a:t>What representation do the date and time fields have in the data?</a:t>
-            </a:r>
-          </a:p>
-          <a:p>
-            <a:r>
-              <a:rPr lang="en-US" dirty="0"/>
-              <a:t>Are there funky timestamps that might represent null values or cloud your interpretation?</a:t>
-            </a:r>
+            <a:endParaRPr lang="en-US"/>
           </a:p>
         </p:txBody>
       </p:sp>
@@ -7465,7 +9293,7 @@
           <p:cNvPr id="4" name="Slide Number Placeholder 3">
             <a:extLst>
               <a:ext uri="{FF2B5EF4-FFF2-40B4-BE49-F238E27FC236}">
-                <a16:creationId xmlns:a16="http://schemas.microsoft.com/office/drawing/2014/main" id="{797A20A1-58A1-4B49-8A94-FE04353BFD99}"/>
+                <a16:creationId xmlns:a16="http://schemas.microsoft.com/office/drawing/2014/main" id="{0C04F156-4291-694D-B05E-1EF6C4F9EC26}"/>
               </a:ext>
             </a:extLst>
           </p:cNvPr>
@@ -7483,7 +9311,7 @@
           <a:p>
             <a:fld id="{934C0642-4071-7D48-AFF8-BD27182896CC}" type="slidenum">
               <a:rPr lang="en-US" smtClean="0"/>
-              <a:t>16</a:t>
+              <a:t>25</a:t>
             </a:fld>
             <a:endParaRPr lang="en-US"/>
           </a:p>
@@ -7492,7 +9320,7 @@
     </p:spTree>
     <p:extLst>
       <p:ext uri="{BB962C8B-B14F-4D97-AF65-F5344CB8AC3E}">
-        <p14:creationId xmlns:p14="http://schemas.microsoft.com/office/powerpoint/2010/main" val="3978360568"/>
+        <p14:creationId xmlns:p14="http://schemas.microsoft.com/office/powerpoint/2010/main" val="3522599257"/>
       </p:ext>
     </p:extLst>
   </p:cSld>
@@ -7502,7 +9330,7 @@
 </p:sld>
 </file>
 
-<file path=ppt/slides/slide17.xml><?xml version="1.0" encoding="utf-8"?>
+<file path=ppt/slides/slide26.xml><?xml version="1.0" encoding="utf-8"?>
 <p:sld xmlns:a="http://schemas.openxmlformats.org/drawingml/2006/main" xmlns:r="http://schemas.openxmlformats.org/officeDocument/2006/relationships" xmlns:p="http://schemas.openxmlformats.org/presentationml/2006/main">
   <p:cSld>
     <p:spTree>
@@ -7524,7 +9352,7 @@
           <p:cNvPr id="2" name="Title 1">
             <a:extLst>
               <a:ext uri="{FF2B5EF4-FFF2-40B4-BE49-F238E27FC236}">
-                <a16:creationId xmlns:a16="http://schemas.microsoft.com/office/drawing/2014/main" id="{8DE23C67-BF27-4140-8271-578D18DEE8DF}"/>
+                <a16:creationId xmlns:a16="http://schemas.microsoft.com/office/drawing/2014/main" id="{431828DF-E3BE-6D44-AC0A-8AED086BC300}"/>
               </a:ext>
             </a:extLst>
           </p:cNvPr>
@@ -7542,7 +9370,7 @@
           <a:p>
             <a:r>
               <a:rPr lang="en-US" dirty="0"/>
-              <a:t>Faithfulness: are the data trustworthy?</a:t>
+              <a:t>Temporality: How is time represented in the data?</a:t>
             </a:r>
           </a:p>
         </p:txBody>
@@ -7552,7 +9380,7 @@
           <p:cNvPr id="3" name="Content Placeholder 2">
             <a:extLst>
               <a:ext uri="{FF2B5EF4-FFF2-40B4-BE49-F238E27FC236}">
-                <a16:creationId xmlns:a16="http://schemas.microsoft.com/office/drawing/2014/main" id="{54D112F6-EA49-EB4F-9569-A92A0090C01F}"/>
+                <a16:creationId xmlns:a16="http://schemas.microsoft.com/office/drawing/2014/main" id="{B9B31E72-C639-704B-B53E-8EA1202214A5}"/>
               </a:ext>
             </a:extLst>
           </p:cNvPr>
@@ -7563,88 +9391,34 @@
             <p:ph idx="1"/>
           </p:nvPr>
         </p:nvSpPr>
-        <p:spPr>
-          <a:xfrm>
-            <a:off x="838200" y="1825625"/>
-            <a:ext cx="10515600" cy="4667250"/>
-          </a:xfrm>
-        </p:spPr>
-        <p:txBody>
-          <a:bodyPr>
-            <a:normAutofit lnSpcReduction="10000"/>
-          </a:bodyPr>
-          <a:lstStyle/>
-          <a:p>
-            <a:pPr marL="0" indent="0">
-              <a:buNone/>
-            </a:pPr>
-            <a:r>
-              <a:rPr lang="en-US" sz="3600" dirty="0"/>
-              <a:t>Faithful data lack:</a:t>
-            </a:r>
-          </a:p>
-          <a:p>
-            <a:r>
-              <a:rPr lang="en-US" dirty="0"/>
-              <a:t>Unrealistic or incorrect values</a:t>
-            </a:r>
-          </a:p>
-          <a:p>
-            <a:r>
-              <a:rPr lang="en-US" dirty="0"/>
-              <a:t>Violations of obvious dependencies</a:t>
+        <p:spPr/>
+        <p:txBody>
+          <a:bodyPr/>
+          <a:lstStyle/>
+          <a:p>
+            <a:r>
+              <a:rPr lang="en-US" dirty="0"/>
+              <a:t>What is the meaning of the date and time fields in the dataset?</a:t>
             </a:r>
           </a:p>
           <a:p>
             <a:pPr lvl="1"/>
             <a:r>
               <a:rPr lang="en-US" dirty="0"/>
-              <a:t>E.g. age and birthday for individuals don’t match</a:t>
-            </a:r>
-          </a:p>
-          <a:p>
-            <a:pPr lvl="1"/>
-            <a:r>
-              <a:rPr lang="en-US" dirty="0"/>
-              <a:t>E.g. sorting by record ID gives different result than sorting by time in </a:t>
-            </a:r>
-            <a:r>
-              <a:rPr lang="en-US" dirty="0" err="1"/>
-              <a:t>PurpleAir</a:t>
-            </a:r>
-            <a:r>
-              <a:rPr lang="en-US" dirty="0"/>
-              <a:t> data</a:t>
-            </a:r>
-          </a:p>
-          <a:p>
-            <a:r>
-              <a:rPr lang="en-US" dirty="0"/>
-              <a:t>Hand-entered data</a:t>
-            </a:r>
-          </a:p>
-          <a:p>
-            <a:pPr lvl="1"/>
-            <a:r>
-              <a:rPr lang="en-US" dirty="0"/>
-              <a:t>Spelling errors, etc.  </a:t>
-            </a:r>
-          </a:p>
-          <a:p>
-            <a:r>
-              <a:rPr lang="en-US" dirty="0"/>
-              <a:t>Clear signs of falsified data</a:t>
-            </a:r>
-          </a:p>
-          <a:p>
-            <a:pPr lvl="1"/>
-            <a:r>
-              <a:rPr lang="en-US" dirty="0"/>
-              <a:t>E.g. repeated names, fake looking email addresses, or repeated use of uncommon names or fields.</a:t>
-            </a:r>
-          </a:p>
-          <a:p>
-            <a:endParaRPr lang="en-US" dirty="0"/>
+              <a:t>Beware of time zones, daylight savings!</a:t>
+            </a:r>
+          </a:p>
+          <a:p>
+            <a:r>
+              <a:rPr lang="en-US" dirty="0"/>
+              <a:t>What representation do the date and time fields have in the data?</a:t>
+            </a:r>
+          </a:p>
+          <a:p>
+            <a:r>
+              <a:rPr lang="en-US" dirty="0"/>
+              <a:t>Are there funky timestamps that might represent null values or cloud your interpretation?</a:t>
+            </a:r>
           </a:p>
         </p:txBody>
       </p:sp>
@@ -7653,7 +9427,7 @@
           <p:cNvPr id="4" name="Slide Number Placeholder 3">
             <a:extLst>
               <a:ext uri="{FF2B5EF4-FFF2-40B4-BE49-F238E27FC236}">
-                <a16:creationId xmlns:a16="http://schemas.microsoft.com/office/drawing/2014/main" id="{8591155A-F6E2-D14A-B101-93D2B75D05E3}"/>
+                <a16:creationId xmlns:a16="http://schemas.microsoft.com/office/drawing/2014/main" id="{797A20A1-58A1-4B49-8A94-FE04353BFD99}"/>
               </a:ext>
             </a:extLst>
           </p:cNvPr>
@@ -7671,7 +9445,7 @@
           <a:p>
             <a:fld id="{934C0642-4071-7D48-AFF8-BD27182896CC}" type="slidenum">
               <a:rPr lang="en-US" smtClean="0"/>
-              <a:t>17</a:t>
+              <a:t>26</a:t>
             </a:fld>
             <a:endParaRPr lang="en-US"/>
           </a:p>
@@ -7680,7 +9454,7 @@
     </p:spTree>
     <p:extLst>
       <p:ext uri="{BB962C8B-B14F-4D97-AF65-F5344CB8AC3E}">
-        <p14:creationId xmlns:p14="http://schemas.microsoft.com/office/powerpoint/2010/main" val="2260340869"/>
+        <p14:creationId xmlns:p14="http://schemas.microsoft.com/office/powerpoint/2010/main" val="3978360568"/>
       </p:ext>
     </p:extLst>
   </p:cSld>
@@ -7690,7 +9464,7 @@
 </p:sld>
 </file>
 
-<file path=ppt/slides/slide18.xml><?xml version="1.0" encoding="utf-8"?>
+<file path=ppt/slides/slide27.xml><?xml version="1.0" encoding="utf-8"?>
 <p:sld xmlns:a="http://schemas.openxmlformats.org/drawingml/2006/main" xmlns:r="http://schemas.openxmlformats.org/officeDocument/2006/relationships" xmlns:p="http://schemas.openxmlformats.org/presentationml/2006/main">
   <p:cSld>
     <p:spTree>
@@ -7709,6 +9483,194 @@
       </p:grpSpPr>
       <p:sp>
         <p:nvSpPr>
+          <p:cNvPr id="2" name="Title 1">
+            <a:extLst>
+              <a:ext uri="{FF2B5EF4-FFF2-40B4-BE49-F238E27FC236}">
+                <a16:creationId xmlns:a16="http://schemas.microsoft.com/office/drawing/2014/main" id="{8DE23C67-BF27-4140-8271-578D18DEE8DF}"/>
+              </a:ext>
+            </a:extLst>
+          </p:cNvPr>
+          <p:cNvSpPr>
+            <a:spLocks noGrp="1"/>
+          </p:cNvSpPr>
+          <p:nvPr>
+            <p:ph type="title"/>
+          </p:nvPr>
+        </p:nvSpPr>
+        <p:spPr/>
+        <p:txBody>
+          <a:bodyPr/>
+          <a:lstStyle/>
+          <a:p>
+            <a:r>
+              <a:rPr lang="en-US" dirty="0"/>
+              <a:t>Faithfulness: are the data trustworthy?</a:t>
+            </a:r>
+          </a:p>
+        </p:txBody>
+      </p:sp>
+      <p:sp>
+        <p:nvSpPr>
+          <p:cNvPr id="3" name="Content Placeholder 2">
+            <a:extLst>
+              <a:ext uri="{FF2B5EF4-FFF2-40B4-BE49-F238E27FC236}">
+                <a16:creationId xmlns:a16="http://schemas.microsoft.com/office/drawing/2014/main" id="{54D112F6-EA49-EB4F-9569-A92A0090C01F}"/>
+              </a:ext>
+            </a:extLst>
+          </p:cNvPr>
+          <p:cNvSpPr>
+            <a:spLocks noGrp="1"/>
+          </p:cNvSpPr>
+          <p:nvPr>
+            <p:ph idx="1"/>
+          </p:nvPr>
+        </p:nvSpPr>
+        <p:spPr>
+          <a:xfrm>
+            <a:off x="838200" y="1825625"/>
+            <a:ext cx="10515600" cy="4667250"/>
+          </a:xfrm>
+        </p:spPr>
+        <p:txBody>
+          <a:bodyPr>
+            <a:normAutofit lnSpcReduction="10000"/>
+          </a:bodyPr>
+          <a:lstStyle/>
+          <a:p>
+            <a:pPr marL="0" indent="0">
+              <a:buNone/>
+            </a:pPr>
+            <a:r>
+              <a:rPr lang="en-US" sz="3600" dirty="0"/>
+              <a:t>Faithful data lack:</a:t>
+            </a:r>
+          </a:p>
+          <a:p>
+            <a:r>
+              <a:rPr lang="en-US" dirty="0"/>
+              <a:t>Unrealistic or incorrect values</a:t>
+            </a:r>
+          </a:p>
+          <a:p>
+            <a:r>
+              <a:rPr lang="en-US" dirty="0"/>
+              <a:t>Violations of obvious dependencies</a:t>
+            </a:r>
+          </a:p>
+          <a:p>
+            <a:pPr lvl="1"/>
+            <a:r>
+              <a:rPr lang="en-US" dirty="0"/>
+              <a:t>E.g. age and birthday for individuals don’t match</a:t>
+            </a:r>
+          </a:p>
+          <a:p>
+            <a:pPr lvl="1"/>
+            <a:r>
+              <a:rPr lang="en-US" dirty="0"/>
+              <a:t>E.g. sorting by record ID gives different result than sorting by time in </a:t>
+            </a:r>
+            <a:r>
+              <a:rPr lang="en-US" dirty="0" err="1"/>
+              <a:t>PurpleAir</a:t>
+            </a:r>
+            <a:r>
+              <a:rPr lang="en-US" dirty="0"/>
+              <a:t> data</a:t>
+            </a:r>
+          </a:p>
+          <a:p>
+            <a:r>
+              <a:rPr lang="en-US" dirty="0"/>
+              <a:t>Hand-entered data</a:t>
+            </a:r>
+          </a:p>
+          <a:p>
+            <a:pPr lvl="1"/>
+            <a:r>
+              <a:rPr lang="en-US" dirty="0"/>
+              <a:t>Spelling errors, etc.  </a:t>
+            </a:r>
+          </a:p>
+          <a:p>
+            <a:r>
+              <a:rPr lang="en-US" dirty="0"/>
+              <a:t>Clear signs of falsified data</a:t>
+            </a:r>
+          </a:p>
+          <a:p>
+            <a:pPr lvl="1"/>
+            <a:r>
+              <a:rPr lang="en-US" dirty="0"/>
+              <a:t>E.g. repeated names, fake looking email addresses, or repeated use of uncommon names or fields.</a:t>
+            </a:r>
+          </a:p>
+          <a:p>
+            <a:endParaRPr lang="en-US" dirty="0"/>
+          </a:p>
+        </p:txBody>
+      </p:sp>
+      <p:sp>
+        <p:nvSpPr>
+          <p:cNvPr id="4" name="Slide Number Placeholder 3">
+            <a:extLst>
+              <a:ext uri="{FF2B5EF4-FFF2-40B4-BE49-F238E27FC236}">
+                <a16:creationId xmlns:a16="http://schemas.microsoft.com/office/drawing/2014/main" id="{8591155A-F6E2-D14A-B101-93D2B75D05E3}"/>
+              </a:ext>
+            </a:extLst>
+          </p:cNvPr>
+          <p:cNvSpPr>
+            <a:spLocks noGrp="1"/>
+          </p:cNvSpPr>
+          <p:nvPr>
+            <p:ph type="sldNum" sz="quarter" idx="12"/>
+          </p:nvPr>
+        </p:nvSpPr>
+        <p:spPr/>
+        <p:txBody>
+          <a:bodyPr/>
+          <a:lstStyle/>
+          <a:p>
+            <a:fld id="{934C0642-4071-7D48-AFF8-BD27182896CC}" type="slidenum">
+              <a:rPr lang="en-US" smtClean="0"/>
+              <a:t>27</a:t>
+            </a:fld>
+            <a:endParaRPr lang="en-US"/>
+          </a:p>
+        </p:txBody>
+      </p:sp>
+    </p:spTree>
+    <p:extLst>
+      <p:ext uri="{BB962C8B-B14F-4D97-AF65-F5344CB8AC3E}">
+        <p14:creationId xmlns:p14="http://schemas.microsoft.com/office/powerpoint/2010/main" val="2260340869"/>
+      </p:ext>
+    </p:extLst>
+  </p:cSld>
+  <p:clrMapOvr>
+    <a:masterClrMapping/>
+  </p:clrMapOvr>
+</p:sld>
+</file>
+
+<file path=ppt/slides/slide28.xml><?xml version="1.0" encoding="utf-8"?>
+<p:sld xmlns:a="http://schemas.openxmlformats.org/drawingml/2006/main" xmlns:r="http://schemas.openxmlformats.org/officeDocument/2006/relationships" xmlns:p="http://schemas.openxmlformats.org/presentationml/2006/main">
+  <p:cSld>
+    <p:spTree>
+      <p:nvGrpSpPr>
+        <p:cNvPr id="1" name=""/>
+        <p:cNvGrpSpPr/>
+        <p:nvPr/>
+      </p:nvGrpSpPr>
+      <p:grpSpPr>
+        <a:xfrm>
+          <a:off x="0" y="0"/>
+          <a:ext cx="0" cy="0"/>
+          <a:chOff x="0" y="0"/>
+          <a:chExt cx="0" cy="0"/>
+        </a:xfrm>
+      </p:grpSpPr>
+      <p:sp>
+        <p:nvSpPr>
           <p:cNvPr id="2" name="Title 1"/>
           <p:cNvSpPr>
             <a:spLocks noGrp="1"/>
@@ -7890,7 +9852,7 @@
           <a:p>
             <a:fld id="{934C0642-4071-7D48-AFF8-BD27182896CC}" type="slidenum">
               <a:rPr lang="en-US" smtClean="0"/>
-              <a:t>18</a:t>
+              <a:t>28</a:t>
             </a:fld>
             <a:endParaRPr lang="en-US"/>
           </a:p>
@@ -8620,7 +10582,7 @@
 </p:sld>
 </file>
 
-<file path=ppt/slides/slide19.xml><?xml version="1.0" encoding="utf-8"?>
+<file path=ppt/slides/slide29.xml><?xml version="1.0" encoding="utf-8"?>
 <p:sld xmlns:a="http://schemas.openxmlformats.org/drawingml/2006/main" xmlns:r="http://schemas.openxmlformats.org/officeDocument/2006/relationships" xmlns:p="http://schemas.openxmlformats.org/presentationml/2006/main">
   <p:cSld>
     <p:spTree>
@@ -8710,7 +10672,7 @@
           <a:p>
             <a:fld id="{934C0642-4071-7D48-AFF8-BD27182896CC}" type="slidenum">
               <a:rPr lang="en-US" smtClean="0"/>
-              <a:t>19</a:t>
+              <a:t>29</a:t>
             </a:fld>
             <a:endParaRPr lang="en-US"/>
           </a:p>
@@ -8720,215 +10682,6 @@
     <p:extLst>
       <p:ext uri="{BB962C8B-B14F-4D97-AF65-F5344CB8AC3E}">
         <p14:creationId xmlns:p14="http://schemas.microsoft.com/office/powerpoint/2010/main" val="3557862469"/>
-      </p:ext>
-    </p:extLst>
-  </p:cSld>
-  <p:clrMapOvr>
-    <a:masterClrMapping/>
-  </p:clrMapOvr>
-</p:sld>
-</file>
-
-<file path=ppt/slides/slide2.xml><?xml version="1.0" encoding="utf-8"?>
-<p:sld xmlns:a="http://schemas.openxmlformats.org/drawingml/2006/main" xmlns:r="http://schemas.openxmlformats.org/officeDocument/2006/relationships" xmlns:p="http://schemas.openxmlformats.org/presentationml/2006/main">
-  <p:cSld>
-    <p:spTree>
-      <p:nvGrpSpPr>
-        <p:cNvPr id="1" name=""/>
-        <p:cNvGrpSpPr/>
-        <p:nvPr/>
-      </p:nvGrpSpPr>
-      <p:grpSpPr>
-        <a:xfrm>
-          <a:off x="0" y="0"/>
-          <a:ext cx="0" cy="0"/>
-          <a:chOff x="0" y="0"/>
-          <a:chExt cx="0" cy="0"/>
-        </a:xfrm>
-      </p:grpSpPr>
-      <p:sp>
-        <p:nvSpPr>
-          <p:cNvPr id="2" name="Title 1">
-            <a:extLst>
-              <a:ext uri="{FF2B5EF4-FFF2-40B4-BE49-F238E27FC236}">
-                <a16:creationId xmlns:a16="http://schemas.microsoft.com/office/drawing/2014/main" id="{244F29F6-84F8-F341-BC98-61AF4AF8F5AE}"/>
-              </a:ext>
-            </a:extLst>
-          </p:cNvPr>
-          <p:cNvSpPr>
-            <a:spLocks noGrp="1"/>
-          </p:cNvSpPr>
-          <p:nvPr>
-            <p:ph type="title"/>
-          </p:nvPr>
-        </p:nvSpPr>
-        <p:spPr/>
-        <p:txBody>
-          <a:bodyPr/>
-          <a:lstStyle/>
-          <a:p>
-            <a:r>
-              <a:rPr lang="en-US" dirty="0"/>
-              <a:t>Announcements</a:t>
-            </a:r>
-          </a:p>
-        </p:txBody>
-      </p:sp>
-      <p:sp>
-        <p:nvSpPr>
-          <p:cNvPr id="3" name="Content Placeholder 2">
-            <a:extLst>
-              <a:ext uri="{FF2B5EF4-FFF2-40B4-BE49-F238E27FC236}">
-                <a16:creationId xmlns:a16="http://schemas.microsoft.com/office/drawing/2014/main" id="{F89E94E5-A5D1-0F46-9790-EB44608AD638}"/>
-              </a:ext>
-            </a:extLst>
-          </p:cNvPr>
-          <p:cNvSpPr>
-            <a:spLocks noGrp="1"/>
-          </p:cNvSpPr>
-          <p:nvPr>
-            <p:ph idx="1"/>
-          </p:nvPr>
-        </p:nvSpPr>
-        <p:spPr/>
-        <p:txBody>
-          <a:bodyPr>
-            <a:normAutofit fontScale="92500" lnSpcReduction="20000"/>
-          </a:bodyPr>
-          <a:lstStyle/>
-          <a:p>
-            <a:r>
-              <a:rPr lang="en-US" dirty="0"/>
-              <a:t>Reminders</a:t>
-            </a:r>
-          </a:p>
-          <a:p>
-            <a:pPr lvl="1"/>
-            <a:r>
-              <a:rPr lang="en-US" dirty="0"/>
-              <a:t>Late policy</a:t>
-            </a:r>
-          </a:p>
-          <a:p>
-            <a:r>
-              <a:rPr lang="en-US" dirty="0"/>
-              <a:t>Lab 2 due yesterday, Lab 3 due next Monday</a:t>
-            </a:r>
-          </a:p>
-          <a:p>
-            <a:r>
-              <a:rPr lang="en-US" dirty="0"/>
-              <a:t>HW2 due Thursday</a:t>
-            </a:r>
-          </a:p>
-          <a:p>
-            <a:r>
-              <a:rPr lang="en-US" dirty="0"/>
-              <a:t>Reading</a:t>
-            </a:r>
-            <a:endParaRPr lang="en-US" i="1" dirty="0"/>
-          </a:p>
-          <a:p>
-            <a:pPr lvl="1"/>
-            <a:r>
-              <a:rPr lang="en-US" dirty="0"/>
-              <a:t>Today: </a:t>
-            </a:r>
-          </a:p>
-          <a:p>
-            <a:pPr lvl="2"/>
-            <a:r>
-              <a:rPr lang="en-US" dirty="0"/>
-              <a:t>Hino </a:t>
-            </a:r>
-            <a:r>
-              <a:rPr lang="en-US" i="1" dirty="0"/>
-              <a:t>et al</a:t>
-            </a:r>
-            <a:r>
-              <a:rPr lang="en-US" dirty="0"/>
-              <a:t>, Pelletier </a:t>
-            </a:r>
-            <a:r>
-              <a:rPr lang="en-US" i="1" dirty="0"/>
-              <a:t>et al</a:t>
-            </a:r>
-            <a:endParaRPr lang="en-US" dirty="0"/>
-          </a:p>
-          <a:p>
-            <a:pPr lvl="2"/>
-            <a:r>
-              <a:rPr lang="en-US" dirty="0"/>
-              <a:t>We will be using material from DS100 Ch4 and 5</a:t>
-            </a:r>
-          </a:p>
-          <a:p>
-            <a:pPr lvl="1"/>
-            <a:r>
-              <a:rPr lang="en-US" dirty="0"/>
-              <a:t>Thursday: DS100 Ch6 textbook (visualization)</a:t>
-            </a:r>
-          </a:p>
-          <a:p>
-            <a:pPr lvl="1"/>
-            <a:r>
-              <a:rPr lang="en-US" dirty="0"/>
-              <a:t>Next Tuesday: </a:t>
-            </a:r>
-          </a:p>
-          <a:p>
-            <a:r>
-              <a:rPr lang="en-US" dirty="0"/>
-              <a:t>Next Tuesday: Josh </a:t>
-            </a:r>
-            <a:r>
-              <a:rPr lang="en-US" dirty="0" err="1"/>
-              <a:t>Apte</a:t>
-            </a:r>
-            <a:r>
-              <a:rPr lang="en-US" dirty="0"/>
-              <a:t>, UT Austin, will talk about his work on the health impacts of PM2.5.  </a:t>
-            </a:r>
-          </a:p>
-          <a:p>
-            <a:pPr lvl="1"/>
-            <a:endParaRPr lang="en-US" dirty="0"/>
-          </a:p>
-        </p:txBody>
-      </p:sp>
-      <p:sp>
-        <p:nvSpPr>
-          <p:cNvPr id="4" name="Slide Number Placeholder 3">
-            <a:extLst>
-              <a:ext uri="{FF2B5EF4-FFF2-40B4-BE49-F238E27FC236}">
-                <a16:creationId xmlns:a16="http://schemas.microsoft.com/office/drawing/2014/main" id="{DFC6B9AC-8210-0641-A7DE-8AB1B992BAF0}"/>
-              </a:ext>
-            </a:extLst>
-          </p:cNvPr>
-          <p:cNvSpPr>
-            <a:spLocks noGrp="1"/>
-          </p:cNvSpPr>
-          <p:nvPr>
-            <p:ph type="sldNum" sz="quarter" idx="12"/>
-          </p:nvPr>
-        </p:nvSpPr>
-        <p:spPr/>
-        <p:txBody>
-          <a:bodyPr/>
-          <a:lstStyle/>
-          <a:p>
-            <a:fld id="{934C0642-4071-7D48-AFF8-BD27182896CC}" type="slidenum">
-              <a:rPr lang="en-US" smtClean="0"/>
-              <a:t>2</a:t>
-            </a:fld>
-            <a:endParaRPr lang="en-US"/>
-          </a:p>
-        </p:txBody>
-      </p:sp>
-    </p:spTree>
-    <p:extLst>
-      <p:ext uri="{BB962C8B-B14F-4D97-AF65-F5344CB8AC3E}">
-        <p14:creationId xmlns:p14="http://schemas.microsoft.com/office/powerpoint/2010/main" val="1284368160"/>
       </p:ext>
     </p:extLst>
   </p:cSld>
@@ -8960,7 +10713,7 @@
           <p:cNvPr id="2" name="Title 1">
             <a:extLst>
               <a:ext uri="{FF2B5EF4-FFF2-40B4-BE49-F238E27FC236}">
-                <a16:creationId xmlns:a16="http://schemas.microsoft.com/office/drawing/2014/main" id="{DAED0CA2-9A20-6D46-90C4-E544C0749726}"/>
+                <a16:creationId xmlns:a16="http://schemas.microsoft.com/office/drawing/2014/main" id="{244F29F6-84F8-F341-BC98-61AF4AF8F5AE}"/>
               </a:ext>
             </a:extLst>
           </p:cNvPr>
@@ -8978,7 +10731,7 @@
           <a:p>
             <a:r>
               <a:rPr lang="en-US" dirty="0"/>
-              <a:t>First, the reading</a:t>
+              <a:t>Announcements</a:t>
             </a:r>
           </a:p>
         </p:txBody>
@@ -8988,7 +10741,7 @@
           <p:cNvPr id="3" name="Content Placeholder 2">
             <a:extLst>
               <a:ext uri="{FF2B5EF4-FFF2-40B4-BE49-F238E27FC236}">
-                <a16:creationId xmlns:a16="http://schemas.microsoft.com/office/drawing/2014/main" id="{DAA31982-0078-EF4B-8DB0-C6ADD156DE6C}"/>
+                <a16:creationId xmlns:a16="http://schemas.microsoft.com/office/drawing/2014/main" id="{F89E94E5-A5D1-0F46-9790-EB44608AD638}"/>
               </a:ext>
             </a:extLst>
           </p:cNvPr>
@@ -8999,73 +10752,55 @@
             <p:ph idx="1"/>
           </p:nvPr>
         </p:nvSpPr>
-        <p:spPr/>
-        <p:txBody>
-          <a:bodyPr/>
-          <a:lstStyle/>
-          <a:p>
-            <a:r>
-              <a:rPr lang="en-US" dirty="0"/>
-              <a:t>Pelletier </a:t>
-            </a:r>
-            <a:r>
-              <a:rPr lang="en-US" i="1" dirty="0"/>
-              <a:t>et al</a:t>
-            </a:r>
-            <a:r>
-              <a:rPr lang="en-US" dirty="0"/>
-              <a:t> and Hino </a:t>
-            </a:r>
-            <a:r>
-              <a:rPr lang="en-US" i="1" dirty="0"/>
-              <a:t>et al</a:t>
-            </a:r>
-            <a:endParaRPr lang="en-US" dirty="0"/>
-          </a:p>
-          <a:p>
-            <a:r>
-              <a:rPr lang="en-US" dirty="0"/>
-              <a:t>Questions to focus on:</a:t>
+        <p:spPr>
+          <a:xfrm>
+            <a:off x="838200" y="1577656"/>
+            <a:ext cx="10515600" cy="4530725"/>
+          </a:xfrm>
+        </p:spPr>
+        <p:txBody>
+          <a:bodyPr>
+            <a:normAutofit/>
+          </a:bodyPr>
+          <a:lstStyle/>
+          <a:p>
+            <a:r>
+              <a:rPr lang="en-US" dirty="0"/>
+              <a:t>Reminders</a:t>
             </a:r>
           </a:p>
           <a:p>
             <a:pPr lvl="1"/>
             <a:r>
               <a:rPr lang="en-US" dirty="0"/>
-              <a:t>What is the prediction question?  Are the authors making predictions across space, time, or some other dimension?</a:t>
-            </a:r>
-          </a:p>
-          <a:p>
-            <a:pPr lvl="1"/>
-            <a:r>
-              <a:rPr lang="en-US" dirty="0"/>
-              <a:t>What is the key policy application?</a:t>
-            </a:r>
-          </a:p>
-          <a:p>
-            <a:pPr lvl="1"/>
-            <a:r>
-              <a:rPr lang="en-US" dirty="0"/>
-              <a:t>Name two or more factors readers should take into consideration as they interpret and implement the results.  These could relate to error </a:t>
+              <a:t>Late policy</a:t>
+            </a:r>
+          </a:p>
+          <a:p>
+            <a:r>
+              <a:rPr lang="en-US" dirty="0"/>
+              <a:t>Lab 2 due yesterday, Lab 3 due next Monday</a:t>
+            </a:r>
+          </a:p>
+          <a:p>
+            <a:r>
+              <a:rPr lang="en-US" dirty="0"/>
+              <a:t>HW2 due Thursday</a:t>
+            </a:r>
+          </a:p>
+          <a:p>
+            <a:r>
+              <a:rPr lang="en-US" dirty="0"/>
+              <a:t>Next Thursday: Dan </a:t>
             </a:r>
             <a:r>
               <a:rPr lang="en-US" dirty="0" err="1"/>
-              <a:t>propogation</a:t>
-            </a:r>
-            <a:r>
-              <a:rPr lang="en-US" dirty="0"/>
-              <a:t>, causal inference or other factors. </a:t>
-            </a:r>
-          </a:p>
-          <a:p>
-            <a:r>
-              <a:rPr lang="en-US" dirty="0"/>
-              <a:t>Discuss both papers.  How are they similar and different?</a:t>
-            </a:r>
-          </a:p>
-          <a:p>
-            <a:pPr lvl="1"/>
-            <a:endParaRPr lang="en-US" dirty="0"/>
+              <a:t>Kammen</a:t>
+            </a:r>
+            <a:r>
+              <a:rPr lang="en-US" dirty="0"/>
+              <a:t> (ERG Professor) will speak about different populations’ access levels to photovoltaics in the US.  </a:t>
+            </a:r>
           </a:p>
         </p:txBody>
       </p:sp>
@@ -9074,7 +10809,7 @@
           <p:cNvPr id="4" name="Slide Number Placeholder 3">
             <a:extLst>
               <a:ext uri="{FF2B5EF4-FFF2-40B4-BE49-F238E27FC236}">
-                <a16:creationId xmlns:a16="http://schemas.microsoft.com/office/drawing/2014/main" id="{D09EFBA3-B8E6-C848-B337-B89B8D0EC597}"/>
+                <a16:creationId xmlns:a16="http://schemas.microsoft.com/office/drawing/2014/main" id="{DFC6B9AC-8210-0641-A7DE-8AB1B992BAF0}"/>
               </a:ext>
             </a:extLst>
           </p:cNvPr>
@@ -9101,7 +10836,7 @@
     </p:spTree>
     <p:extLst>
       <p:ext uri="{BB962C8B-B14F-4D97-AF65-F5344CB8AC3E}">
-        <p14:creationId xmlns:p14="http://schemas.microsoft.com/office/powerpoint/2010/main" val="1581224222"/>
+        <p14:creationId xmlns:p14="http://schemas.microsoft.com/office/powerpoint/2010/main" val="1284368160"/>
       </p:ext>
     </p:extLst>
   </p:cSld>
@@ -9133,7 +10868,7 @@
           <p:cNvPr id="2" name="Title 1">
             <a:extLst>
               <a:ext uri="{FF2B5EF4-FFF2-40B4-BE49-F238E27FC236}">
-                <a16:creationId xmlns:a16="http://schemas.microsoft.com/office/drawing/2014/main" id="{423B989D-7A2B-6F4E-9CD9-A149D73A85A8}"/>
+                <a16:creationId xmlns:a16="http://schemas.microsoft.com/office/drawing/2014/main" id="{BABADFB3-1FB1-C547-893C-3911865CCEDD}"/>
               </a:ext>
             </a:extLst>
           </p:cNvPr>
@@ -9151,7 +10886,7 @@
           <a:p>
             <a:r>
               <a:rPr lang="en-US" dirty="0"/>
-              <a:t>Questions for data cleaning</a:t>
+              <a:t>Upcoming reading</a:t>
             </a:r>
           </a:p>
         </p:txBody>
@@ -9161,7 +10896,7 @@
           <p:cNvPr id="3" name="Content Placeholder 2">
             <a:extLst>
               <a:ext uri="{FF2B5EF4-FFF2-40B4-BE49-F238E27FC236}">
-                <a16:creationId xmlns:a16="http://schemas.microsoft.com/office/drawing/2014/main" id="{13FD5E8A-16D3-A541-9C5F-24816BFD8995}"/>
+                <a16:creationId xmlns:a16="http://schemas.microsoft.com/office/drawing/2014/main" id="{CE623731-6E23-3345-A0F8-D33B3FDDD6FF}"/>
               </a:ext>
             </a:extLst>
           </p:cNvPr>
@@ -9179,57 +10914,81 @@
           <a:p>
             <a:r>
               <a:rPr lang="en-US" dirty="0"/>
-              <a:t>Do you see missing values?</a:t>
-            </a:r>
-          </a:p>
-          <a:p>
-            <a:r>
-              <a:rPr lang="en-US" dirty="0"/>
-              <a:t>Are there cells where missing values were obviously filled in?</a:t>
-            </a:r>
-          </a:p>
-          <a:p>
-            <a:r>
-              <a:rPr lang="en-US" dirty="0"/>
-              <a:t>Are there cells where values are clearly wrong?</a:t>
-            </a:r>
-          </a:p>
-          <a:p>
-            <a:r>
-              <a:rPr lang="en-US" dirty="0"/>
-              <a:t>Are there values where two entries could mean the same thing?  Often human-entered values, e.g.:  </a:t>
+              <a:t>Today: </a:t>
             </a:r>
           </a:p>
           <a:p>
             <a:pPr lvl="1"/>
             <a:r>
               <a:rPr lang="en-US" dirty="0"/>
-              <a:t>canine and k9; </a:t>
-            </a:r>
+              <a:t>Hino </a:t>
+            </a:r>
+            <a:r>
+              <a:rPr lang="en-US" i="1" dirty="0"/>
+              <a:t>et al</a:t>
+            </a:r>
+            <a:r>
+              <a:rPr lang="en-US" dirty="0"/>
+              <a:t>, Pelletier </a:t>
+            </a:r>
+            <a:r>
+              <a:rPr lang="en-US" i="1" dirty="0"/>
+              <a:t>et al</a:t>
+            </a:r>
+            <a:endParaRPr lang="en-US" dirty="0"/>
           </a:p>
           <a:p>
             <a:pPr lvl="1"/>
             <a:r>
               <a:rPr lang="en-US" dirty="0"/>
-              <a:t>recommend and recommend, </a:t>
-            </a:r>
-          </a:p>
-          <a:p>
-            <a:pPr lvl="1"/>
-            <a:r>
-              <a:rPr lang="en-US" dirty="0"/>
-              <a:t>Zürich and Zurich </a:t>
+              <a:t>We will be using material from DS100 Ch4 and 5</a:t>
+            </a:r>
+          </a:p>
+          <a:p>
+            <a:r>
+              <a:rPr lang="en-US" dirty="0"/>
+              <a:t>Thursday: DS100 Ch6 textbook (visualization)</a:t>
+            </a:r>
+          </a:p>
+          <a:p>
+            <a:r>
+              <a:rPr lang="en-US" dirty="0"/>
+              <a:t>Next Tuesday: Ch 10 of DS100, Ch 2 of ISLR</a:t>
+            </a:r>
+          </a:p>
+          <a:p>
+            <a:r>
+              <a:rPr lang="en-US" dirty="0"/>
+              <a:t>Next Thursday: </a:t>
             </a:r>
             <a:r>
               <a:rPr lang="en-US" dirty="0" err="1"/>
-              <a:t>etc</a:t>
-            </a:r>
+              <a:t>Sunter</a:t>
+            </a:r>
+            <a:r>
+              <a:rPr lang="en-US" dirty="0"/>
+              <a:t> </a:t>
+            </a:r>
+            <a:r>
+              <a:rPr lang="en-US" i="1" dirty="0"/>
+              <a:t>et al </a:t>
+            </a:r>
+            <a:r>
+              <a:rPr lang="en-US" dirty="0"/>
+              <a:t>(</a:t>
+            </a:r>
+            <a:r>
+              <a:rPr lang="en-US" dirty="0" err="1"/>
+              <a:t>Kammen</a:t>
+            </a:r>
+            <a:r>
+              <a:rPr lang="en-US" dirty="0"/>
+              <a:t> will present this paper)</a:t>
+            </a:r>
+          </a:p>
+          <a:p>
             <a:endParaRPr lang="en-US" dirty="0"/>
           </a:p>
-          <a:p>
-            <a:pPr lvl="1"/>
-            <a:endParaRPr lang="en-US" dirty="0"/>
-          </a:p>
         </p:txBody>
       </p:sp>
       <p:sp>
@@ -9237,7 +10996,7 @@
           <p:cNvPr id="4" name="Slide Number Placeholder 3">
             <a:extLst>
               <a:ext uri="{FF2B5EF4-FFF2-40B4-BE49-F238E27FC236}">
-                <a16:creationId xmlns:a16="http://schemas.microsoft.com/office/drawing/2014/main" id="{4595E02E-464F-6D42-8E8B-67C4F3E0D890}"/>
+                <a16:creationId xmlns:a16="http://schemas.microsoft.com/office/drawing/2014/main" id="{3647F8F1-A894-1842-ABCE-4420FBD3D342}"/>
               </a:ext>
             </a:extLst>
           </p:cNvPr>
@@ -9264,7 +11023,7 @@
     </p:spTree>
     <p:extLst>
       <p:ext uri="{BB962C8B-B14F-4D97-AF65-F5344CB8AC3E}">
-        <p14:creationId xmlns:p14="http://schemas.microsoft.com/office/powerpoint/2010/main" val="4279606409"/>
+        <p14:creationId xmlns:p14="http://schemas.microsoft.com/office/powerpoint/2010/main" val="3149033440"/>
       </p:ext>
     </p:extLst>
   </p:cSld>
@@ -9296,7 +11055,7 @@
           <p:cNvPr id="2" name="Title 1">
             <a:extLst>
               <a:ext uri="{FF2B5EF4-FFF2-40B4-BE49-F238E27FC236}">
-                <a16:creationId xmlns:a16="http://schemas.microsoft.com/office/drawing/2014/main" id="{4F90A4E4-2B39-CA47-883B-9AD2AAAAFE27}"/>
+                <a16:creationId xmlns:a16="http://schemas.microsoft.com/office/drawing/2014/main" id="{1089B039-378E-4146-ABC9-5EB250532A38}"/>
               </a:ext>
             </a:extLst>
           </p:cNvPr>
@@ -9314,7 +11073,7 @@
           <a:p>
             <a:r>
               <a:rPr lang="en-US" dirty="0"/>
-              <a:t>Data merging</a:t>
+              <a:t>Today</a:t>
             </a:r>
           </a:p>
         </p:txBody>
@@ -9324,7 +11083,7 @@
           <p:cNvPr id="3" name="Content Placeholder 2">
             <a:extLst>
               <a:ext uri="{FF2B5EF4-FFF2-40B4-BE49-F238E27FC236}">
-                <a16:creationId xmlns:a16="http://schemas.microsoft.com/office/drawing/2014/main" id="{6DAF17E0-2358-DE43-AFF3-F2DEC9D73ADB}"/>
+                <a16:creationId xmlns:a16="http://schemas.microsoft.com/office/drawing/2014/main" id="{DF8A9386-7339-5B42-8C75-63E8DDE7BCD2}"/>
               </a:ext>
             </a:extLst>
           </p:cNvPr>
@@ -9342,33 +11101,51 @@
           <a:p>
             <a:r>
               <a:rPr lang="en-US" dirty="0"/>
-              <a:t>How many rows and columns do you have when you start?</a:t>
-            </a:r>
-          </a:p>
-          <a:p>
-            <a:r>
-              <a:rPr lang="en-US" dirty="0"/>
-              <a:t>How many do you have after the merge?</a:t>
-            </a:r>
-          </a:p>
-          <a:p>
-            <a:r>
-              <a:rPr lang="en-US" dirty="0"/>
-              <a:t>What’s missing?  Is it acceptable to you if you’ve lost some data?</a:t>
+              <a:t>Understanding how prediction tools get applied to policy problems (Hino et al and Pelletier et al)</a:t>
             </a:r>
           </a:p>
           <a:p>
             <a:pPr lvl="1"/>
             <a:r>
               <a:rPr lang="en-US" dirty="0"/>
-              <a:t>We’ll return to this when we talk about faithfulness and scope.  </a:t>
-            </a:r>
-          </a:p>
-          <a:p>
-            <a:r>
-              <a:rPr lang="en-US" dirty="0"/>
-              <a:t>I wrote a script for the class to use in the upcoming homework that helps decipher what data gets lost.  </a:t>
-            </a:r>
+              <a:t>Objective: that you have more fuel for scoping project questions and understanding the uses and abuses of prediction tools</a:t>
+            </a:r>
+          </a:p>
+          <a:p>
+            <a:r>
+              <a:rPr lang="en-US" dirty="0"/>
+              <a:t>Exploratory data analysis and data cleaning – basic guidelines</a:t>
+            </a:r>
+          </a:p>
+          <a:p>
+            <a:pPr lvl="1"/>
+            <a:r>
+              <a:rPr lang="en-US" dirty="0"/>
+              <a:t>Objective: acquire some guiding principles for working with new data</a:t>
+            </a:r>
+          </a:p>
+          <a:p>
+            <a:r>
+              <a:rPr lang="en-US" dirty="0"/>
+              <a:t>Exploratory data analysis and data cleaning – in practice</a:t>
+            </a:r>
+          </a:p>
+          <a:p>
+            <a:pPr lvl="1"/>
+            <a:r>
+              <a:rPr lang="en-US" dirty="0"/>
+              <a:t>We’ll use a local air quality data set</a:t>
+            </a:r>
+          </a:p>
+          <a:p>
+            <a:pPr lvl="1"/>
+            <a:r>
+              <a:rPr lang="en-US" dirty="0"/>
+              <a:t>Objective: see some specific issues that come up with a new data set.</a:t>
+            </a:r>
+          </a:p>
+          <a:p>
+            <a:endParaRPr lang="en-US" dirty="0"/>
           </a:p>
         </p:txBody>
       </p:sp>
@@ -9377,7 +11154,7 @@
           <p:cNvPr id="4" name="Slide Number Placeholder 3">
             <a:extLst>
               <a:ext uri="{FF2B5EF4-FFF2-40B4-BE49-F238E27FC236}">
-                <a16:creationId xmlns:a16="http://schemas.microsoft.com/office/drawing/2014/main" id="{07597DCD-8735-534B-AF25-7D8D97DC91A9}"/>
+                <a16:creationId xmlns:a16="http://schemas.microsoft.com/office/drawing/2014/main" id="{98962B12-C10D-6340-B2C6-AFA6DA71CF9D}"/>
               </a:ext>
             </a:extLst>
           </p:cNvPr>
@@ -9404,7 +11181,7 @@
     </p:spTree>
     <p:extLst>
       <p:ext uri="{BB962C8B-B14F-4D97-AF65-F5344CB8AC3E}">
-        <p14:creationId xmlns:p14="http://schemas.microsoft.com/office/powerpoint/2010/main" val="1247774137"/>
+        <p14:creationId xmlns:p14="http://schemas.microsoft.com/office/powerpoint/2010/main" val="201090443"/>
       </p:ext>
     </p:extLst>
   </p:cSld>
@@ -9436,7 +11213,7 @@
           <p:cNvPr id="2" name="Title 1">
             <a:extLst>
               <a:ext uri="{FF2B5EF4-FFF2-40B4-BE49-F238E27FC236}">
-                <a16:creationId xmlns:a16="http://schemas.microsoft.com/office/drawing/2014/main" id="{EC9F9301-055B-D74D-B420-C90EB94E8AFF}"/>
+                <a16:creationId xmlns:a16="http://schemas.microsoft.com/office/drawing/2014/main" id="{DAED0CA2-9A20-6D46-90C4-E544C0749726}"/>
               </a:ext>
             </a:extLst>
           </p:cNvPr>
@@ -9449,86 +11226,99 @@
         </p:nvSpPr>
         <p:spPr/>
         <p:txBody>
-          <a:bodyPr>
-            <a:normAutofit/>
-          </a:bodyPr>
-          <a:lstStyle/>
-          <a:p>
-            <a:r>
-              <a:rPr lang="en-US" dirty="0"/>
-              <a:t>As we proceed, let’s play with the </a:t>
+          <a:bodyPr/>
+          <a:lstStyle/>
+          <a:p>
+            <a:r>
+              <a:rPr lang="en-US" dirty="0"/>
+              <a:t>First, the reading</a:t>
+            </a:r>
+          </a:p>
+        </p:txBody>
+      </p:sp>
+      <p:sp>
+        <p:nvSpPr>
+          <p:cNvPr id="3" name="Content Placeholder 2">
+            <a:extLst>
+              <a:ext uri="{FF2B5EF4-FFF2-40B4-BE49-F238E27FC236}">
+                <a16:creationId xmlns:a16="http://schemas.microsoft.com/office/drawing/2014/main" id="{DAA31982-0078-EF4B-8DB0-C6ADD156DE6C}"/>
+              </a:ext>
+            </a:extLst>
+          </p:cNvPr>
+          <p:cNvSpPr>
+            <a:spLocks noGrp="1"/>
+          </p:cNvSpPr>
+          <p:nvPr>
+            <p:ph idx="1"/>
+          </p:nvPr>
+        </p:nvSpPr>
+        <p:spPr/>
+        <p:txBody>
+          <a:bodyPr/>
+          <a:lstStyle/>
+          <a:p>
+            <a:r>
+              <a:rPr lang="en-US" dirty="0"/>
+              <a:t>Pelletier </a:t>
+            </a:r>
+            <a:r>
+              <a:rPr lang="en-US" i="1" dirty="0"/>
+              <a:t>et al</a:t>
+            </a:r>
+            <a:r>
+              <a:rPr lang="en-US" dirty="0"/>
+              <a:t> and Hino </a:t>
+            </a:r>
+            <a:r>
+              <a:rPr lang="en-US" i="1" dirty="0"/>
+              <a:t>et al</a:t>
+            </a:r>
+            <a:endParaRPr lang="en-US" dirty="0"/>
+          </a:p>
+          <a:p>
+            <a:r>
+              <a:rPr lang="en-US" dirty="0"/>
+              <a:t>Questions to focus on:</a:t>
+            </a:r>
+          </a:p>
+          <a:p>
+            <a:pPr lvl="1"/>
+            <a:r>
+              <a:rPr lang="en-US" dirty="0"/>
+              <a:t>What is the prediction question?  Are the authors making predictions across space, time, or some other dimension?</a:t>
+            </a:r>
+          </a:p>
+          <a:p>
+            <a:pPr lvl="1"/>
+            <a:r>
+              <a:rPr lang="en-US" dirty="0"/>
+              <a:t>What is the key policy application?</a:t>
+            </a:r>
+          </a:p>
+          <a:p>
+            <a:pPr lvl="1"/>
+            <a:r>
+              <a:rPr lang="en-US" dirty="0"/>
+              <a:t>Name two or more factors readers should take into consideration as they interpret and implement the results.  These could relate to error </a:t>
             </a:r>
             <a:r>
               <a:rPr lang="en-US" dirty="0" err="1"/>
-              <a:t>PurpleAir</a:t>
-            </a:r>
-            <a:r>
-              <a:rPr lang="en-US" dirty="0"/>
-              <a:t> data set.  </a:t>
-            </a:r>
-          </a:p>
-        </p:txBody>
-      </p:sp>
-      <p:sp>
-        <p:nvSpPr>
-          <p:cNvPr id="3" name="Content Placeholder 2">
-            <a:extLst>
-              <a:ext uri="{FF2B5EF4-FFF2-40B4-BE49-F238E27FC236}">
-                <a16:creationId xmlns:a16="http://schemas.microsoft.com/office/drawing/2014/main" id="{E2401AB3-8E8E-2A41-9AB9-DE0A5E002718}"/>
-              </a:ext>
-            </a:extLst>
-          </p:cNvPr>
-          <p:cNvSpPr>
-            <a:spLocks noGrp="1"/>
-          </p:cNvSpPr>
-          <p:nvPr>
-            <p:ph idx="1"/>
-          </p:nvPr>
-        </p:nvSpPr>
-        <p:spPr>
-          <a:xfrm>
-            <a:off x="511233" y="1847850"/>
-            <a:ext cx="5957587" cy="4351338"/>
-          </a:xfrm>
-        </p:spPr>
-        <p:txBody>
-          <a:bodyPr>
-            <a:normAutofit/>
-          </a:bodyPr>
-          <a:lstStyle/>
-          <a:p>
-            <a:pPr marL="0" indent="0">
-              <a:buNone/>
-            </a:pPr>
-            <a:r>
-              <a:rPr lang="en-US" sz="3200" dirty="0"/>
-              <a:t>First, a little more on PM.  S</a:t>
-            </a:r>
-            <a:r>
-              <a:rPr lang="en-US" dirty="0"/>
-              <a:t>ources:</a:t>
+              <a:t>propogation</a:t>
+            </a:r>
+            <a:r>
+              <a:rPr lang="en-US" dirty="0"/>
+              <a:t>, causal inference or other factors. </a:t>
+            </a:r>
+          </a:p>
+          <a:p>
+            <a:r>
+              <a:rPr lang="en-US" dirty="0"/>
+              <a:t>Discuss both papers.  How are they similar and different?</a:t>
             </a:r>
           </a:p>
           <a:p>
             <a:pPr lvl="1"/>
-            <a:r>
-              <a:rPr lang="en-US" dirty="0"/>
-              <a:t>Many sizes and shapes and can be made up of hundreds of different chemicals.</a:t>
-            </a:r>
-          </a:p>
-          <a:p>
-            <a:pPr lvl="1"/>
-            <a:r>
-              <a:rPr lang="en-US" dirty="0"/>
-              <a:t>Some directly from a source: construction sites, unpaved roads, fields, smokestacks or fires.</a:t>
-            </a:r>
-          </a:p>
-          <a:p>
-            <a:pPr lvl="1"/>
-            <a:r>
-              <a:rPr lang="en-US" dirty="0"/>
-              <a:t>Most form in the atmosphere by complex reactions of chemicals such as sulfur dioxide and nitrogen oxides</a:t>
-            </a:r>
+            <a:endParaRPr lang="en-US" dirty="0"/>
           </a:p>
         </p:txBody>
       </p:sp>
@@ -9537,7 +11327,7 @@
           <p:cNvPr id="4" name="Slide Number Placeholder 3">
             <a:extLst>
               <a:ext uri="{FF2B5EF4-FFF2-40B4-BE49-F238E27FC236}">
-                <a16:creationId xmlns:a16="http://schemas.microsoft.com/office/drawing/2014/main" id="{7847ABF5-9B1D-DF4F-9DA4-D0F6B6B72057}"/>
+                <a16:creationId xmlns:a16="http://schemas.microsoft.com/office/drawing/2014/main" id="{D09EFBA3-B8E6-C848-B337-B89B8D0EC597}"/>
               </a:ext>
             </a:extLst>
           </p:cNvPr>
@@ -9561,40 +11351,10 @@
           </a:p>
         </p:txBody>
       </p:sp>
-      <p:pic>
-        <p:nvPicPr>
-          <p:cNvPr id="5" name="Picture 4">
-            <a:extLst>
-              <a:ext uri="{FF2B5EF4-FFF2-40B4-BE49-F238E27FC236}">
-                <a16:creationId xmlns:a16="http://schemas.microsoft.com/office/drawing/2014/main" id="{690B2D8D-1887-C149-8B9D-CEC9971D8F58}"/>
-              </a:ext>
-            </a:extLst>
-          </p:cNvPr>
-          <p:cNvPicPr>
-            <a:picLocks noChangeAspect="1"/>
-          </p:cNvPicPr>
-          <p:nvPr/>
-        </p:nvPicPr>
-        <p:blipFill>
-          <a:blip r:embed="rId2"/>
-          <a:stretch>
-            <a:fillRect/>
-          </a:stretch>
-        </p:blipFill>
-        <p:spPr>
-          <a:xfrm>
-            <a:off x="6468820" y="2086769"/>
-            <a:ext cx="5561949" cy="3873500"/>
-          </a:xfrm>
-          <a:prstGeom prst="rect">
-            <a:avLst/>
-          </a:prstGeom>
-        </p:spPr>
-      </p:pic>
     </p:spTree>
     <p:extLst>
       <p:ext uri="{BB962C8B-B14F-4D97-AF65-F5344CB8AC3E}">
-        <p14:creationId xmlns:p14="http://schemas.microsoft.com/office/powerpoint/2010/main" val="3126903609"/>
+        <p14:creationId xmlns:p14="http://schemas.microsoft.com/office/powerpoint/2010/main" val="1581224222"/>
       </p:ext>
     </p:extLst>
   </p:cSld>
@@ -9626,7 +11386,7 @@
           <p:cNvPr id="2" name="Title 1">
             <a:extLst>
               <a:ext uri="{FF2B5EF4-FFF2-40B4-BE49-F238E27FC236}">
-                <a16:creationId xmlns:a16="http://schemas.microsoft.com/office/drawing/2014/main" id="{77BAC7B4-B79E-874C-905F-9BAC5B7C02B1}"/>
+                <a16:creationId xmlns:a16="http://schemas.microsoft.com/office/drawing/2014/main" id="{83FACA12-1E63-ED4D-BBA3-EDA54D36F56A}"/>
               </a:ext>
             </a:extLst>
           </p:cNvPr>
@@ -9644,8 +11404,13 @@
           <a:p>
             <a:r>
               <a:rPr lang="en-US" dirty="0"/>
-              <a:t>More on PM2.5…</a:t>
-            </a:r>
+              <a:t>Hino </a:t>
+            </a:r>
+            <a:r>
+              <a:rPr lang="en-US" i="1" dirty="0"/>
+              <a:t>et al</a:t>
+            </a:r>
+            <a:endParaRPr lang="en-US" dirty="0"/>
           </a:p>
         </p:txBody>
       </p:sp>
@@ -9654,7 +11419,7 @@
           <p:cNvPr id="3" name="Content Placeholder 2">
             <a:extLst>
               <a:ext uri="{FF2B5EF4-FFF2-40B4-BE49-F238E27FC236}">
-                <a16:creationId xmlns:a16="http://schemas.microsoft.com/office/drawing/2014/main" id="{86A20542-5AF8-774B-85C3-6135461A6E60}"/>
+                <a16:creationId xmlns:a16="http://schemas.microsoft.com/office/drawing/2014/main" id="{D9CA07C6-E932-7242-B90C-578430E3BF4C}"/>
               </a:ext>
             </a:extLst>
           </p:cNvPr>
@@ -9667,117 +11432,95 @@
         </p:nvSpPr>
         <p:spPr>
           <a:xfrm>
-            <a:off x="838200" y="1460500"/>
-            <a:ext cx="10515600" cy="5092699"/>
+            <a:off x="578604" y="1546872"/>
+            <a:ext cx="11034792" cy="5174603"/>
           </a:xfrm>
         </p:spPr>
         <p:txBody>
           <a:bodyPr>
-            <a:normAutofit fontScale="92500" lnSpcReduction="10000"/>
+            <a:normAutofit fontScale="92500" lnSpcReduction="20000"/>
           </a:bodyPr>
           <a:lstStyle/>
           <a:p>
             <a:r>
               <a:rPr lang="en-US" dirty="0"/>
-              <a:t>(text adapted from </a:t>
+              <a:t>“Here, we predict the likelihood of a facility failing a water- pollution inspection and propose alternative inspection allocations that would target high-risk facilities.”</a:t>
+            </a:r>
+          </a:p>
+          <a:p>
+            <a:pPr lvl="1"/>
+            <a:r>
+              <a:rPr lang="en-US" dirty="0"/>
+              <a:t>Predictions across facilities</a:t>
+            </a:r>
+          </a:p>
+          <a:p>
+            <a:pPr lvl="1"/>
+            <a:r>
+              <a:rPr lang="en-US" dirty="0"/>
+              <a:t>Application:  Increase identification of polluters for given budget</a:t>
+            </a:r>
+          </a:p>
+          <a:p>
+            <a:r>
+              <a:rPr lang="en-US" dirty="0"/>
+              <a:t>They seek at address </a:t>
             </a:r>
             <a:r>
               <a:rPr lang="en-US" dirty="0" err="1"/>
-              <a:t>epa.gov</a:t>
-            </a:r>
-            <a:r>
-              <a:rPr lang="en-US" dirty="0"/>
-              <a:t>) Health effects:</a:t>
+              <a:t>Athey’s</a:t>
+            </a:r>
+            <a:r>
+              <a:rPr lang="en-US" dirty="0"/>
+              <a:t> concerns by adding constraints in the resource allocation rules.</a:t>
             </a:r>
           </a:p>
           <a:p>
             <a:pPr lvl="1"/>
             <a:r>
               <a:rPr lang="en-US" dirty="0"/>
-              <a:t>premature death in people with heart or lung disease</a:t>
+              <a:t>State level inspection budget differences</a:t>
             </a:r>
           </a:p>
           <a:p>
             <a:pPr lvl="1"/>
             <a:r>
               <a:rPr lang="en-US" dirty="0"/>
-              <a:t>nonfatal heart attacks</a:t>
+              <a:t>Minimum inspection probability</a:t>
+            </a:r>
+          </a:p>
+          <a:p>
+            <a:r>
+              <a:rPr lang="en-US" dirty="0"/>
+              <a:t>Concerns</a:t>
             </a:r>
           </a:p>
           <a:p>
             <a:pPr lvl="1"/>
             <a:r>
               <a:rPr lang="en-US" dirty="0"/>
-              <a:t>irregular heartbeat</a:t>
+              <a:t>What if different facilities cost more to inspect?</a:t>
             </a:r>
           </a:p>
           <a:p>
             <a:pPr lvl="1"/>
             <a:r>
               <a:rPr lang="en-US" dirty="0"/>
-              <a:t>aggravated asthma</a:t>
+              <a:t>“External validity”: are the inspected facilities (the training data) representative of all facilities?</a:t>
             </a:r>
           </a:p>
           <a:p>
             <a:pPr lvl="1"/>
             <a:r>
               <a:rPr lang="en-US" dirty="0"/>
-              <a:t>decreased lung function</a:t>
+              <a:t>Strategic response still possible</a:t>
             </a:r>
           </a:p>
           <a:p>
             <a:pPr lvl="1"/>
             <a:r>
               <a:rPr lang="en-US" dirty="0"/>
-              <a:t>increased respiratory symptoms, such as irritation of the airways</a:t>
-            </a:r>
-          </a:p>
-          <a:p>
-            <a:r>
-              <a:rPr lang="en-US" dirty="0"/>
-              <a:t>Environmental effects</a:t>
-            </a:r>
-          </a:p>
-          <a:p>
-            <a:pPr lvl="1"/>
-            <a:r>
-              <a:rPr lang="en-US" dirty="0"/>
-              <a:t>makes lakes and streams acidic</a:t>
-            </a:r>
-          </a:p>
-          <a:p>
-            <a:pPr lvl="1"/>
-            <a:r>
-              <a:rPr lang="en-US" dirty="0"/>
-              <a:t>changes the nutrient balance in coastal waters and large river basins</a:t>
-            </a:r>
-          </a:p>
-          <a:p>
-            <a:pPr lvl="1"/>
-            <a:r>
-              <a:rPr lang="en-US" dirty="0"/>
-              <a:t>depletes soil nutrients</a:t>
-            </a:r>
-          </a:p>
-          <a:p>
-            <a:pPr lvl="1"/>
-            <a:r>
-              <a:rPr lang="en-US" dirty="0"/>
-              <a:t>damages sensitive forests and farm crops</a:t>
-            </a:r>
-          </a:p>
-          <a:p>
-            <a:pPr lvl="1"/>
-            <a:r>
-              <a:rPr lang="en-US" dirty="0"/>
-              <a:t>affects the diversity of ecosystems</a:t>
-            </a:r>
-          </a:p>
-          <a:p>
-            <a:pPr lvl="1"/>
-            <a:r>
-              <a:rPr lang="en-US" dirty="0"/>
-              <a:t>contributes to acid rain</a:t>
+              <a:t>What do the inspectors know that we don’t?  What might they think of this paper?</a:t>
             </a:r>
           </a:p>
         </p:txBody>
@@ -9787,7 +11530,7 @@
           <p:cNvPr id="4" name="Slide Number Placeholder 3">
             <a:extLst>
               <a:ext uri="{FF2B5EF4-FFF2-40B4-BE49-F238E27FC236}">
-                <a16:creationId xmlns:a16="http://schemas.microsoft.com/office/drawing/2014/main" id="{5C50DC2E-8D1A-F94F-B9E2-EC7F64466A95}"/>
+                <a16:creationId xmlns:a16="http://schemas.microsoft.com/office/drawing/2014/main" id="{946E1B1A-9150-4646-A542-E7F98FDC5D30}"/>
               </a:ext>
             </a:extLst>
           </p:cNvPr>
@@ -9814,13 +11557,420 @@
     </p:spTree>
     <p:extLst>
       <p:ext uri="{BB962C8B-B14F-4D97-AF65-F5344CB8AC3E}">
-        <p14:creationId xmlns:p14="http://schemas.microsoft.com/office/powerpoint/2010/main" val="4005058995"/>
+        <p14:creationId xmlns:p14="http://schemas.microsoft.com/office/powerpoint/2010/main" val="3539895425"/>
       </p:ext>
     </p:extLst>
   </p:cSld>
   <p:clrMapOvr>
     <a:masterClrMapping/>
   </p:clrMapOvr>
+  <p:timing>
+    <p:tnLst>
+      <p:par>
+        <p:cTn id="1" dur="indefinite" restart="never" nodeType="tmRoot">
+          <p:childTnLst>
+            <p:seq concurrent="1" nextAc="seek">
+              <p:cTn id="2" dur="indefinite" nodeType="mainSeq">
+                <p:childTnLst>
+                  <p:par>
+                    <p:cTn id="3" fill="hold">
+                      <p:stCondLst>
+                        <p:cond delay="indefinite"/>
+                      </p:stCondLst>
+                      <p:childTnLst>
+                        <p:par>
+                          <p:cTn id="4" fill="hold">
+                            <p:stCondLst>
+                              <p:cond delay="0"/>
+                            </p:stCondLst>
+                            <p:childTnLst>
+                              <p:par>
+                                <p:cTn id="5" presetID="1" presetClass="entr" presetSubtype="0" fill="hold" nodeType="clickEffect">
+                                  <p:stCondLst>
+                                    <p:cond delay="0"/>
+                                  </p:stCondLst>
+                                  <p:childTnLst>
+                                    <p:set>
+                                      <p:cBhvr>
+                                        <p:cTn id="6" dur="1" fill="hold">
+                                          <p:stCondLst>
+                                            <p:cond delay="0"/>
+                                          </p:stCondLst>
+                                        </p:cTn>
+                                        <p:tgtEl>
+                                          <p:spTgt spid="3">
+                                            <p:txEl>
+                                              <p:pRg st="0" end="0"/>
+                                            </p:txEl>
+                                          </p:spTgt>
+                                        </p:tgtEl>
+                                        <p:attrNameLst>
+                                          <p:attrName>style.visibility</p:attrName>
+                                        </p:attrNameLst>
+                                      </p:cBhvr>
+                                      <p:to>
+                                        <p:strVal val="visible"/>
+                                      </p:to>
+                                    </p:set>
+                                  </p:childTnLst>
+                                </p:cTn>
+                              </p:par>
+                              <p:par>
+                                <p:cTn id="7" presetID="1" presetClass="entr" presetSubtype="0" fill="hold" nodeType="withEffect">
+                                  <p:stCondLst>
+                                    <p:cond delay="0"/>
+                                  </p:stCondLst>
+                                  <p:childTnLst>
+                                    <p:set>
+                                      <p:cBhvr>
+                                        <p:cTn id="8" dur="1" fill="hold">
+                                          <p:stCondLst>
+                                            <p:cond delay="0"/>
+                                          </p:stCondLst>
+                                        </p:cTn>
+                                        <p:tgtEl>
+                                          <p:spTgt spid="3">
+                                            <p:txEl>
+                                              <p:pRg st="1" end="1"/>
+                                            </p:txEl>
+                                          </p:spTgt>
+                                        </p:tgtEl>
+                                        <p:attrNameLst>
+                                          <p:attrName>style.visibility</p:attrName>
+                                        </p:attrNameLst>
+                                      </p:cBhvr>
+                                      <p:to>
+                                        <p:strVal val="visible"/>
+                                      </p:to>
+                                    </p:set>
+                                  </p:childTnLst>
+                                </p:cTn>
+                              </p:par>
+                              <p:par>
+                                <p:cTn id="9" presetID="1" presetClass="entr" presetSubtype="0" fill="hold" nodeType="withEffect">
+                                  <p:stCondLst>
+                                    <p:cond delay="0"/>
+                                  </p:stCondLst>
+                                  <p:childTnLst>
+                                    <p:set>
+                                      <p:cBhvr>
+                                        <p:cTn id="10" dur="1" fill="hold">
+                                          <p:stCondLst>
+                                            <p:cond delay="0"/>
+                                          </p:stCondLst>
+                                        </p:cTn>
+                                        <p:tgtEl>
+                                          <p:spTgt spid="3">
+                                            <p:txEl>
+                                              <p:pRg st="2" end="2"/>
+                                            </p:txEl>
+                                          </p:spTgt>
+                                        </p:tgtEl>
+                                        <p:attrNameLst>
+                                          <p:attrName>style.visibility</p:attrName>
+                                        </p:attrNameLst>
+                                      </p:cBhvr>
+                                      <p:to>
+                                        <p:strVal val="visible"/>
+                                      </p:to>
+                                    </p:set>
+                                  </p:childTnLst>
+                                </p:cTn>
+                              </p:par>
+                              <p:par>
+                                <p:cTn id="11" presetID="1" presetClass="entr" presetSubtype="0" fill="hold" nodeType="withEffect">
+                                  <p:stCondLst>
+                                    <p:cond delay="0"/>
+                                  </p:stCondLst>
+                                  <p:childTnLst>
+                                    <p:set>
+                                      <p:cBhvr>
+                                        <p:cTn id="12" dur="1" fill="hold">
+                                          <p:stCondLst>
+                                            <p:cond delay="0"/>
+                                          </p:stCondLst>
+                                        </p:cTn>
+                                        <p:tgtEl>
+                                          <p:spTgt spid="3">
+                                            <p:txEl>
+                                              <p:pRg st="3" end="3"/>
+                                            </p:txEl>
+                                          </p:spTgt>
+                                        </p:tgtEl>
+                                        <p:attrNameLst>
+                                          <p:attrName>style.visibility</p:attrName>
+                                        </p:attrNameLst>
+                                      </p:cBhvr>
+                                      <p:to>
+                                        <p:strVal val="visible"/>
+                                      </p:to>
+                                    </p:set>
+                                  </p:childTnLst>
+                                </p:cTn>
+                              </p:par>
+                              <p:par>
+                                <p:cTn id="13" presetID="1" presetClass="entr" presetSubtype="0" fill="hold" nodeType="withEffect">
+                                  <p:stCondLst>
+                                    <p:cond delay="0"/>
+                                  </p:stCondLst>
+                                  <p:childTnLst>
+                                    <p:set>
+                                      <p:cBhvr>
+                                        <p:cTn id="14" dur="1" fill="hold">
+                                          <p:stCondLst>
+                                            <p:cond delay="0"/>
+                                          </p:stCondLst>
+                                        </p:cTn>
+                                        <p:tgtEl>
+                                          <p:spTgt spid="3">
+                                            <p:txEl>
+                                              <p:pRg st="4" end="4"/>
+                                            </p:txEl>
+                                          </p:spTgt>
+                                        </p:tgtEl>
+                                        <p:attrNameLst>
+                                          <p:attrName>style.visibility</p:attrName>
+                                        </p:attrNameLst>
+                                      </p:cBhvr>
+                                      <p:to>
+                                        <p:strVal val="visible"/>
+                                      </p:to>
+                                    </p:set>
+                                  </p:childTnLst>
+                                </p:cTn>
+                              </p:par>
+                              <p:par>
+                                <p:cTn id="15" presetID="1" presetClass="entr" presetSubtype="0" fill="hold" nodeType="withEffect">
+                                  <p:stCondLst>
+                                    <p:cond delay="0"/>
+                                  </p:stCondLst>
+                                  <p:childTnLst>
+                                    <p:set>
+                                      <p:cBhvr>
+                                        <p:cTn id="16" dur="1" fill="hold">
+                                          <p:stCondLst>
+                                            <p:cond delay="0"/>
+                                          </p:stCondLst>
+                                        </p:cTn>
+                                        <p:tgtEl>
+                                          <p:spTgt spid="3">
+                                            <p:txEl>
+                                              <p:pRg st="5" end="5"/>
+                                            </p:txEl>
+                                          </p:spTgt>
+                                        </p:tgtEl>
+                                        <p:attrNameLst>
+                                          <p:attrName>style.visibility</p:attrName>
+                                        </p:attrNameLst>
+                                      </p:cBhvr>
+                                      <p:to>
+                                        <p:strVal val="visible"/>
+                                      </p:to>
+                                    </p:set>
+                                  </p:childTnLst>
+                                </p:cTn>
+                              </p:par>
+                            </p:childTnLst>
+                          </p:cTn>
+                        </p:par>
+                      </p:childTnLst>
+                    </p:cTn>
+                  </p:par>
+                  <p:par>
+                    <p:cTn id="17" fill="hold">
+                      <p:stCondLst>
+                        <p:cond delay="indefinite"/>
+                      </p:stCondLst>
+                      <p:childTnLst>
+                        <p:par>
+                          <p:cTn id="18" fill="hold">
+                            <p:stCondLst>
+                              <p:cond delay="0"/>
+                            </p:stCondLst>
+                            <p:childTnLst>
+                              <p:par>
+                                <p:cTn id="19" presetID="1" presetClass="entr" presetSubtype="0" fill="hold" nodeType="clickEffect">
+                                  <p:stCondLst>
+                                    <p:cond delay="0"/>
+                                  </p:stCondLst>
+                                  <p:childTnLst>
+                                    <p:set>
+                                      <p:cBhvr>
+                                        <p:cTn id="20" dur="1" fill="hold">
+                                          <p:stCondLst>
+                                            <p:cond delay="0"/>
+                                          </p:stCondLst>
+                                        </p:cTn>
+                                        <p:tgtEl>
+                                          <p:spTgt spid="3">
+                                            <p:txEl>
+                                              <p:pRg st="6" end="6"/>
+                                            </p:txEl>
+                                          </p:spTgt>
+                                        </p:tgtEl>
+                                        <p:attrNameLst>
+                                          <p:attrName>style.visibility</p:attrName>
+                                        </p:attrNameLst>
+                                      </p:cBhvr>
+                                      <p:to>
+                                        <p:strVal val="visible"/>
+                                      </p:to>
+                                    </p:set>
+                                  </p:childTnLst>
+                                </p:cTn>
+                              </p:par>
+                              <p:par>
+                                <p:cTn id="21" presetID="1" presetClass="entr" presetSubtype="0" fill="hold" nodeType="withEffect">
+                                  <p:stCondLst>
+                                    <p:cond delay="0"/>
+                                  </p:stCondLst>
+                                  <p:childTnLst>
+                                    <p:set>
+                                      <p:cBhvr>
+                                        <p:cTn id="22" dur="1" fill="hold">
+                                          <p:stCondLst>
+                                            <p:cond delay="0"/>
+                                          </p:stCondLst>
+                                        </p:cTn>
+                                        <p:tgtEl>
+                                          <p:spTgt spid="3">
+                                            <p:txEl>
+                                              <p:pRg st="7" end="7"/>
+                                            </p:txEl>
+                                          </p:spTgt>
+                                        </p:tgtEl>
+                                        <p:attrNameLst>
+                                          <p:attrName>style.visibility</p:attrName>
+                                        </p:attrNameLst>
+                                      </p:cBhvr>
+                                      <p:to>
+                                        <p:strVal val="visible"/>
+                                      </p:to>
+                                    </p:set>
+                                  </p:childTnLst>
+                                </p:cTn>
+                              </p:par>
+                              <p:par>
+                                <p:cTn id="23" presetID="1" presetClass="entr" presetSubtype="0" fill="hold" nodeType="withEffect">
+                                  <p:stCondLst>
+                                    <p:cond delay="0"/>
+                                  </p:stCondLst>
+                                  <p:childTnLst>
+                                    <p:set>
+                                      <p:cBhvr>
+                                        <p:cTn id="24" dur="1" fill="hold">
+                                          <p:stCondLst>
+                                            <p:cond delay="0"/>
+                                          </p:stCondLst>
+                                        </p:cTn>
+                                        <p:tgtEl>
+                                          <p:spTgt spid="3">
+                                            <p:txEl>
+                                              <p:pRg st="8" end="8"/>
+                                            </p:txEl>
+                                          </p:spTgt>
+                                        </p:tgtEl>
+                                        <p:attrNameLst>
+                                          <p:attrName>style.visibility</p:attrName>
+                                        </p:attrNameLst>
+                                      </p:cBhvr>
+                                      <p:to>
+                                        <p:strVal val="visible"/>
+                                      </p:to>
+                                    </p:set>
+                                  </p:childTnLst>
+                                </p:cTn>
+                              </p:par>
+                              <p:par>
+                                <p:cTn id="25" presetID="1" presetClass="entr" presetSubtype="0" fill="hold" nodeType="withEffect">
+                                  <p:stCondLst>
+                                    <p:cond delay="0"/>
+                                  </p:stCondLst>
+                                  <p:childTnLst>
+                                    <p:set>
+                                      <p:cBhvr>
+                                        <p:cTn id="26" dur="1" fill="hold">
+                                          <p:stCondLst>
+                                            <p:cond delay="0"/>
+                                          </p:stCondLst>
+                                        </p:cTn>
+                                        <p:tgtEl>
+                                          <p:spTgt spid="3">
+                                            <p:txEl>
+                                              <p:pRg st="9" end="9"/>
+                                            </p:txEl>
+                                          </p:spTgt>
+                                        </p:tgtEl>
+                                        <p:attrNameLst>
+                                          <p:attrName>style.visibility</p:attrName>
+                                        </p:attrNameLst>
+                                      </p:cBhvr>
+                                      <p:to>
+                                        <p:strVal val="visible"/>
+                                      </p:to>
+                                    </p:set>
+                                  </p:childTnLst>
+                                </p:cTn>
+                              </p:par>
+                              <p:par>
+                                <p:cTn id="27" presetID="1" presetClass="entr" presetSubtype="0" fill="hold" nodeType="withEffect">
+                                  <p:stCondLst>
+                                    <p:cond delay="0"/>
+                                  </p:stCondLst>
+                                  <p:childTnLst>
+                                    <p:set>
+                                      <p:cBhvr>
+                                        <p:cTn id="28" dur="1" fill="hold">
+                                          <p:stCondLst>
+                                            <p:cond delay="0"/>
+                                          </p:stCondLst>
+                                        </p:cTn>
+                                        <p:tgtEl>
+                                          <p:spTgt spid="3">
+                                            <p:txEl>
+                                              <p:pRg st="10" end="10"/>
+                                            </p:txEl>
+                                          </p:spTgt>
+                                        </p:tgtEl>
+                                        <p:attrNameLst>
+                                          <p:attrName>style.visibility</p:attrName>
+                                        </p:attrNameLst>
+                                      </p:cBhvr>
+                                      <p:to>
+                                        <p:strVal val="visible"/>
+                                      </p:to>
+                                    </p:set>
+                                  </p:childTnLst>
+                                </p:cTn>
+                              </p:par>
+                            </p:childTnLst>
+                          </p:cTn>
+                        </p:par>
+                      </p:childTnLst>
+                    </p:cTn>
+                  </p:par>
+                </p:childTnLst>
+              </p:cTn>
+              <p:prevCondLst>
+                <p:cond evt="onPrev" delay="0">
+                  <p:tgtEl>
+                    <p:sldTgt/>
+                  </p:tgtEl>
+                </p:cond>
+              </p:prevCondLst>
+              <p:nextCondLst>
+                <p:cond evt="onNext" delay="0">
+                  <p:tgtEl>
+                    <p:sldTgt/>
+                  </p:tgtEl>
+                </p:cond>
+              </p:nextCondLst>
+            </p:seq>
+          </p:childTnLst>
+        </p:cTn>
+      </p:par>
+    </p:tnLst>
+  </p:timing>
 </p:sld>
 </file>
 
@@ -9843,38 +11993,10 @@
       </p:grpSpPr>
       <p:sp>
         <p:nvSpPr>
-          <p:cNvPr id="2" name="Title 1">
-            <a:extLst>
-              <a:ext uri="{FF2B5EF4-FFF2-40B4-BE49-F238E27FC236}">
-                <a16:creationId xmlns:a16="http://schemas.microsoft.com/office/drawing/2014/main" id="{46F115E8-5508-D045-9890-A3845A84524C}"/>
-              </a:ext>
-            </a:extLst>
-          </p:cNvPr>
-          <p:cNvSpPr>
-            <a:spLocks noGrp="1"/>
-          </p:cNvSpPr>
-          <p:nvPr>
-            <p:ph type="title"/>
-          </p:nvPr>
-        </p:nvSpPr>
-        <p:spPr/>
-        <p:txBody>
-          <a:bodyPr/>
-          <a:lstStyle/>
-          <a:p>
-            <a:r>
-              <a:rPr lang="en-US" dirty="0"/>
-              <a:t>Exploratory Data Analysis (EDA)</a:t>
-            </a:r>
-          </a:p>
-        </p:txBody>
-      </p:sp>
-      <p:sp>
-        <p:nvSpPr>
           <p:cNvPr id="3" name="Content Placeholder 2">
             <a:extLst>
               <a:ext uri="{FF2B5EF4-FFF2-40B4-BE49-F238E27FC236}">
-                <a16:creationId xmlns:a16="http://schemas.microsoft.com/office/drawing/2014/main" id="{AEA37523-53AF-FE4F-A620-A4251A6EE2A9}"/>
+                <a16:creationId xmlns:a16="http://schemas.microsoft.com/office/drawing/2014/main" id="{396746E5-29CB-DB4B-AF2B-1F4DBA52E23B}"/>
               </a:ext>
             </a:extLst>
           </p:cNvPr>
@@ -9885,48 +12007,102 @@
             <p:ph idx="1"/>
           </p:nvPr>
         </p:nvSpPr>
-        <p:spPr/>
-        <p:txBody>
-          <a:bodyPr/>
-          <a:lstStyle/>
-          <a:p>
-            <a:pPr marL="0" indent="0">
-              <a:buNone/>
-            </a:pPr>
-            <a:r>
-              <a:rPr lang="en-US" dirty="0"/>
-              <a:t>One can approach EDA by asking questions about the data:</a:t>
-            </a:r>
-          </a:p>
-          <a:p>
-            <a:r>
-              <a:rPr lang="en-US" dirty="0"/>
-              <a:t>Structure</a:t>
-            </a:r>
-          </a:p>
-          <a:p>
-            <a:r>
-              <a:rPr lang="en-US" dirty="0"/>
-              <a:t>Granularity</a:t>
-            </a:r>
-          </a:p>
-          <a:p>
-            <a:r>
-              <a:rPr lang="en-US" dirty="0"/>
-              <a:t>Scope</a:t>
-            </a:r>
-          </a:p>
-          <a:p>
-            <a:r>
-              <a:rPr lang="en-US" dirty="0"/>
-              <a:t>Temporality</a:t>
-            </a:r>
-          </a:p>
-          <a:p>
-            <a:r>
-              <a:rPr lang="en-US" dirty="0"/>
-              <a:t>Faithfulness</a:t>
-            </a:r>
+        <p:spPr>
+          <a:xfrm>
+            <a:off x="838200" y="3429000"/>
+            <a:ext cx="10515600" cy="3292475"/>
+          </a:xfrm>
+        </p:spPr>
+        <p:txBody>
+          <a:bodyPr>
+            <a:normAutofit fontScale="92500" lnSpcReduction="20000"/>
+          </a:bodyPr>
+          <a:lstStyle/>
+          <a:p>
+            <a:pPr fontAlgn="base"/>
+            <a:r>
+              <a:rPr lang="en-US" dirty="0"/>
+              <a:t>“The total number of compliance inspections by EPA has </a:t>
+            </a:r>
+            <a:r>
+              <a:rPr lang="en-US" b="1" dirty="0"/>
+              <a:t>dropped by</a:t>
+            </a:r>
+            <a:r>
+              <a:rPr lang="en-US" dirty="0"/>
+              <a:t> </a:t>
+            </a:r>
+            <a:r>
+              <a:rPr lang="en-US" b="1" dirty="0"/>
+              <a:t>one-third</a:t>
+            </a:r>
+            <a:r>
+              <a:rPr lang="en-US" dirty="0"/>
+              <a:t>, since 2015.</a:t>
+            </a:r>
+          </a:p>
+          <a:p>
+            <a:pPr fontAlgn="base"/>
+            <a:r>
+              <a:rPr lang="en-US" dirty="0"/>
+              <a:t>Total enforcement cases resolved — </a:t>
+            </a:r>
+            <a:r>
+              <a:rPr lang="en-US" b="1" dirty="0"/>
+              <a:t>down by 50%</a:t>
+            </a:r>
+            <a:r>
+              <a:rPr lang="en-US" dirty="0"/>
+              <a:t>, since 2017.</a:t>
+            </a:r>
+          </a:p>
+          <a:p>
+            <a:pPr fontAlgn="base"/>
+            <a:r>
+              <a:rPr lang="en-US" dirty="0"/>
+              <a:t>Compliance spending by polluters has also </a:t>
+            </a:r>
+            <a:r>
+              <a:rPr lang="en-US" b="1" dirty="0"/>
+              <a:t>plunged by half</a:t>
+            </a:r>
+            <a:r>
+              <a:rPr lang="en-US" dirty="0"/>
+              <a:t>, since 2015.</a:t>
+            </a:r>
+          </a:p>
+          <a:p>
+            <a:pPr fontAlgn="base"/>
+            <a:r>
+              <a:rPr lang="en-US" dirty="0"/>
+              <a:t>Significant violations of the Clean Water Act at major facilities and high priority violations of the Clean Air Act have collectively </a:t>
+            </a:r>
+            <a:r>
+              <a:rPr lang="en-US" b="1" dirty="0"/>
+              <a:t>spiked by 19%</a:t>
+            </a:r>
+            <a:r>
+              <a:rPr lang="en-US" dirty="0"/>
+              <a:t>, in the past four years. And,</a:t>
+            </a:r>
+          </a:p>
+          <a:p>
+            <a:pPr fontAlgn="base"/>
+            <a:r>
+              <a:rPr lang="en-US" dirty="0"/>
+              <a:t>The total number of enforcement office staff at EPA </a:t>
+            </a:r>
+            <a:r>
+              <a:rPr lang="en-US" b="1" dirty="0"/>
+              <a:t>fell by 16%</a:t>
+            </a:r>
+            <a:r>
+              <a:rPr lang="en-US" dirty="0"/>
+              <a:t>, in the first 18 months of Trump’s presidency.”</a:t>
+            </a:r>
+          </a:p>
+          <a:p>
+            <a:endParaRPr lang="en-US" dirty="0"/>
           </a:p>
         </p:txBody>
       </p:sp>
@@ -9935,7 +12111,7 @@
           <p:cNvPr id="4" name="Slide Number Placeholder 3">
             <a:extLst>
               <a:ext uri="{FF2B5EF4-FFF2-40B4-BE49-F238E27FC236}">
-                <a16:creationId xmlns:a16="http://schemas.microsoft.com/office/drawing/2014/main" id="{F44EE564-C00E-7A42-B959-54073575C4B3}"/>
+                <a16:creationId xmlns:a16="http://schemas.microsoft.com/office/drawing/2014/main" id="{DD40CE56-F1E8-094B-A8C2-89A1D96231D7}"/>
               </a:ext>
             </a:extLst>
           </p:cNvPr>
@@ -9959,10 +12135,40 @@
           </a:p>
         </p:txBody>
       </p:sp>
+      <p:pic>
+        <p:nvPicPr>
+          <p:cNvPr id="7" name="Picture 6">
+            <a:extLst>
+              <a:ext uri="{FF2B5EF4-FFF2-40B4-BE49-F238E27FC236}">
+                <a16:creationId xmlns:a16="http://schemas.microsoft.com/office/drawing/2014/main" id="{F2952616-6C9A-5B49-BFCA-C83AB258545C}"/>
+              </a:ext>
+            </a:extLst>
+          </p:cNvPr>
+          <p:cNvPicPr>
+            <a:picLocks noChangeAspect="1"/>
+          </p:cNvPicPr>
+          <p:nvPr/>
+        </p:nvPicPr>
+        <p:blipFill>
+          <a:blip r:embed="rId3"/>
+          <a:stretch>
+            <a:fillRect/>
+          </a:stretch>
+        </p:blipFill>
+        <p:spPr>
+          <a:xfrm>
+            <a:off x="2314369" y="0"/>
+            <a:ext cx="7563261" cy="3239850"/>
+          </a:xfrm>
+          <a:prstGeom prst="rect">
+            <a:avLst/>
+          </a:prstGeom>
+        </p:spPr>
+      </p:pic>
     </p:spTree>
     <p:extLst>
       <p:ext uri="{BB962C8B-B14F-4D97-AF65-F5344CB8AC3E}">
-        <p14:creationId xmlns:p14="http://schemas.microsoft.com/office/powerpoint/2010/main" val="591534505"/>
+        <p14:creationId xmlns:p14="http://schemas.microsoft.com/office/powerpoint/2010/main" val="3666309341"/>
       </p:ext>
     </p:extLst>
   </p:cSld>
@@ -9994,7 +12200,7 @@
           <p:cNvPr id="2" name="Title 1">
             <a:extLst>
               <a:ext uri="{FF2B5EF4-FFF2-40B4-BE49-F238E27FC236}">
-                <a16:creationId xmlns:a16="http://schemas.microsoft.com/office/drawing/2014/main" id="{3F15EF94-753F-3948-B515-BEFC41583160}"/>
+                <a16:creationId xmlns:a16="http://schemas.microsoft.com/office/drawing/2014/main" id="{A5DCDC5F-2A81-864A-ABDD-958939EBF7A5}"/>
               </a:ext>
             </a:extLst>
           </p:cNvPr>
@@ -10005,14 +12211,23 @@
             <p:ph type="title"/>
           </p:nvPr>
         </p:nvSpPr>
-        <p:spPr/>
+        <p:spPr>
+          <a:xfrm>
+            <a:off x="838200" y="185835"/>
+            <a:ext cx="10515600" cy="1325563"/>
+          </a:xfrm>
+        </p:spPr>
         <p:txBody>
           <a:bodyPr/>
           <a:lstStyle/>
           <a:p>
             <a:r>
               <a:rPr lang="en-US" dirty="0"/>
-              <a:t>Structure – how are the data stored?</a:t>
+              <a:t>Pelletier </a:t>
+            </a:r>
+            <a:r>
+              <a:rPr lang="en-US" i="1" dirty="0"/>
+              <a:t>et al</a:t>
             </a:r>
           </a:p>
         </p:txBody>
@@ -10022,7 +12237,7 @@
           <p:cNvPr id="3" name="Content Placeholder 2">
             <a:extLst>
               <a:ext uri="{FF2B5EF4-FFF2-40B4-BE49-F238E27FC236}">
-                <a16:creationId xmlns:a16="http://schemas.microsoft.com/office/drawing/2014/main" id="{B853B4C4-F8F2-CD44-ABD0-C3D92227CDDD}"/>
+                <a16:creationId xmlns:a16="http://schemas.microsoft.com/office/drawing/2014/main" id="{8CDD267C-B7E2-2B4F-9C5E-9DF73FBF0FEF}"/>
               </a:ext>
             </a:extLst>
           </p:cNvPr>
@@ -10033,54 +12248,66 @@
             <p:ph idx="1"/>
           </p:nvPr>
         </p:nvSpPr>
-        <p:spPr/>
+        <p:spPr>
+          <a:xfrm>
+            <a:off x="838200" y="1605134"/>
+            <a:ext cx="10515600" cy="4751119"/>
+          </a:xfrm>
+        </p:spPr>
         <p:txBody>
           <a:bodyPr>
-            <a:normAutofit/>
+            <a:normAutofit fontScale="92500" lnSpcReduction="10000"/>
           </a:bodyPr>
           <a:lstStyle/>
           <a:p>
             <a:r>
-              <a:rPr lang="en-US" dirty="0"/>
-              <a:t>Are the data in a standard format or encoding?</a:t>
+              <a:rPr lang="en-US" b="1" dirty="0"/>
+              <a:t>Objective</a:t>
+            </a:r>
+            <a:r>
+              <a:rPr lang="en-US" dirty="0"/>
+              <a:t>: Predict conservation status of land plant species based on publicly available data.</a:t>
             </a:r>
           </a:p>
           <a:p>
             <a:pPr lvl="1"/>
             <a:r>
               <a:rPr lang="en-US" dirty="0"/>
-              <a:t>Tabular data: CSV, TSV, Excel, SQL</a:t>
+              <a:t>“Our results indicate that a large number of unassessed species have a high probability of being at risk, and these probabilities can be used to establish assessment prioritization.”</a:t>
             </a:r>
           </a:p>
           <a:p>
             <a:pPr lvl="1"/>
             <a:r>
               <a:rPr lang="en-US" dirty="0"/>
-              <a:t>Nested data: JSON, XML</a:t>
-            </a:r>
-          </a:p>
-          <a:p>
-            <a:r>
-              <a:rPr lang="en-US" dirty="0"/>
-              <a:t>Are the data organized in records (e.g. rows)? If not, can we define records by parsing the data?</a:t>
-            </a:r>
-          </a:p>
-          <a:p>
-            <a:r>
-              <a:rPr lang="en-US" dirty="0"/>
-              <a:t>Are the data nested? If so, can we reasonably un-nest the data?</a:t>
-            </a:r>
-          </a:p>
-          <a:p>
-            <a:r>
-              <a:rPr lang="en-US" dirty="0"/>
-              <a:t>Do the data reference other data? If so, can we join the data?</a:t>
-            </a:r>
-          </a:p>
-          <a:p>
-            <a:r>
-              <a:rPr lang="en-US" dirty="0"/>
-              <a:t>What are the fields (e.g. columns) in each record? What is the type of each column?</a:t>
+              <a:t>Predictions across space</a:t>
+            </a:r>
+          </a:p>
+          <a:p>
+            <a:pPr lvl="1"/>
+            <a:r>
+              <a:rPr lang="en-US" dirty="0"/>
+              <a:t>Application: create guide for identifying species of concern; preserve biodiversity</a:t>
+            </a:r>
+          </a:p>
+          <a:p>
+            <a:r>
+              <a:rPr lang="en-US" dirty="0"/>
+              <a:t>They are careful to talk about variables’ importance for prediction without invoking the language of inference.</a:t>
+            </a:r>
+          </a:p>
+          <a:p>
+            <a:pPr lvl="1"/>
+            <a:r>
+              <a:rPr lang="en-US" dirty="0"/>
+              <a:t>“Although we did identify trends in the variables that contribute the most to at-risk classifiers across continents, there is no one single global variable that predicts conservation status.”</a:t>
+            </a:r>
+          </a:p>
+          <a:p>
+            <a:pPr lvl="1"/>
+            <a:r>
+              <a:rPr lang="en-US" dirty="0"/>
+              <a:t>They use the language “explanatory variable” which makes me a little uncomfortable.  </a:t>
             </a:r>
           </a:p>
         </p:txBody>
@@ -10090,7 +12317,7 @@
           <p:cNvPr id="4" name="Slide Number Placeholder 3">
             <a:extLst>
               <a:ext uri="{FF2B5EF4-FFF2-40B4-BE49-F238E27FC236}">
-                <a16:creationId xmlns:a16="http://schemas.microsoft.com/office/drawing/2014/main" id="{3614E8E2-6203-C645-9E96-5772F90C990C}"/>
+                <a16:creationId xmlns:a16="http://schemas.microsoft.com/office/drawing/2014/main" id="{011ADE34-B3EC-5649-8383-C9AEBDCDBFAD}"/>
               </a:ext>
             </a:extLst>
           </p:cNvPr>
@@ -10117,13 +12344,296 @@
     </p:spTree>
     <p:extLst>
       <p:ext uri="{BB962C8B-B14F-4D97-AF65-F5344CB8AC3E}">
-        <p14:creationId xmlns:p14="http://schemas.microsoft.com/office/powerpoint/2010/main" val="2166552454"/>
+        <p14:creationId xmlns:p14="http://schemas.microsoft.com/office/powerpoint/2010/main" val="1714005973"/>
       </p:ext>
     </p:extLst>
   </p:cSld>
   <p:clrMapOvr>
     <a:masterClrMapping/>
   </p:clrMapOvr>
+  <p:timing>
+    <p:tnLst>
+      <p:par>
+        <p:cTn id="1" dur="indefinite" restart="never" nodeType="tmRoot">
+          <p:childTnLst>
+            <p:seq concurrent="1" nextAc="seek">
+              <p:cTn id="2" dur="indefinite" nodeType="mainSeq">
+                <p:childTnLst>
+                  <p:par>
+                    <p:cTn id="3" fill="hold">
+                      <p:stCondLst>
+                        <p:cond delay="indefinite"/>
+                      </p:stCondLst>
+                      <p:childTnLst>
+                        <p:par>
+                          <p:cTn id="4" fill="hold">
+                            <p:stCondLst>
+                              <p:cond delay="0"/>
+                            </p:stCondLst>
+                            <p:childTnLst>
+                              <p:par>
+                                <p:cTn id="5" presetID="1" presetClass="entr" presetSubtype="0" fill="hold" nodeType="clickEffect">
+                                  <p:stCondLst>
+                                    <p:cond delay="0"/>
+                                  </p:stCondLst>
+                                  <p:childTnLst>
+                                    <p:set>
+                                      <p:cBhvr>
+                                        <p:cTn id="6" dur="1" fill="hold">
+                                          <p:stCondLst>
+                                            <p:cond delay="0"/>
+                                          </p:stCondLst>
+                                        </p:cTn>
+                                        <p:tgtEl>
+                                          <p:spTgt spid="3">
+                                            <p:txEl>
+                                              <p:pRg st="0" end="0"/>
+                                            </p:txEl>
+                                          </p:spTgt>
+                                        </p:tgtEl>
+                                        <p:attrNameLst>
+                                          <p:attrName>style.visibility</p:attrName>
+                                        </p:attrNameLst>
+                                      </p:cBhvr>
+                                      <p:to>
+                                        <p:strVal val="visible"/>
+                                      </p:to>
+                                    </p:set>
+                                  </p:childTnLst>
+                                </p:cTn>
+                              </p:par>
+                              <p:par>
+                                <p:cTn id="7" presetID="1" presetClass="entr" presetSubtype="0" fill="hold" nodeType="withEffect">
+                                  <p:stCondLst>
+                                    <p:cond delay="0"/>
+                                  </p:stCondLst>
+                                  <p:childTnLst>
+                                    <p:set>
+                                      <p:cBhvr>
+                                        <p:cTn id="8" dur="1" fill="hold">
+                                          <p:stCondLst>
+                                            <p:cond delay="0"/>
+                                          </p:stCondLst>
+                                        </p:cTn>
+                                        <p:tgtEl>
+                                          <p:spTgt spid="3">
+                                            <p:txEl>
+                                              <p:pRg st="1" end="1"/>
+                                            </p:txEl>
+                                          </p:spTgt>
+                                        </p:tgtEl>
+                                        <p:attrNameLst>
+                                          <p:attrName>style.visibility</p:attrName>
+                                        </p:attrNameLst>
+                                      </p:cBhvr>
+                                      <p:to>
+                                        <p:strVal val="visible"/>
+                                      </p:to>
+                                    </p:set>
+                                  </p:childTnLst>
+                                </p:cTn>
+                              </p:par>
+                              <p:par>
+                                <p:cTn id="9" presetID="1" presetClass="entr" presetSubtype="0" fill="hold" nodeType="withEffect">
+                                  <p:stCondLst>
+                                    <p:cond delay="0"/>
+                                  </p:stCondLst>
+                                  <p:childTnLst>
+                                    <p:set>
+                                      <p:cBhvr>
+                                        <p:cTn id="10" dur="1" fill="hold">
+                                          <p:stCondLst>
+                                            <p:cond delay="0"/>
+                                          </p:stCondLst>
+                                        </p:cTn>
+                                        <p:tgtEl>
+                                          <p:spTgt spid="3">
+                                            <p:txEl>
+                                              <p:pRg st="2" end="2"/>
+                                            </p:txEl>
+                                          </p:spTgt>
+                                        </p:tgtEl>
+                                        <p:attrNameLst>
+                                          <p:attrName>style.visibility</p:attrName>
+                                        </p:attrNameLst>
+                                      </p:cBhvr>
+                                      <p:to>
+                                        <p:strVal val="visible"/>
+                                      </p:to>
+                                    </p:set>
+                                  </p:childTnLst>
+                                </p:cTn>
+                              </p:par>
+                              <p:par>
+                                <p:cTn id="11" presetID="1" presetClass="entr" presetSubtype="0" fill="hold" nodeType="withEffect">
+                                  <p:stCondLst>
+                                    <p:cond delay="0"/>
+                                  </p:stCondLst>
+                                  <p:childTnLst>
+                                    <p:set>
+                                      <p:cBhvr>
+                                        <p:cTn id="12" dur="1" fill="hold">
+                                          <p:stCondLst>
+                                            <p:cond delay="0"/>
+                                          </p:stCondLst>
+                                        </p:cTn>
+                                        <p:tgtEl>
+                                          <p:spTgt spid="3">
+                                            <p:txEl>
+                                              <p:pRg st="3" end="3"/>
+                                            </p:txEl>
+                                          </p:spTgt>
+                                        </p:tgtEl>
+                                        <p:attrNameLst>
+                                          <p:attrName>style.visibility</p:attrName>
+                                        </p:attrNameLst>
+                                      </p:cBhvr>
+                                      <p:to>
+                                        <p:strVal val="visible"/>
+                                      </p:to>
+                                    </p:set>
+                                  </p:childTnLst>
+                                </p:cTn>
+                              </p:par>
+                            </p:childTnLst>
+                          </p:cTn>
+                        </p:par>
+                      </p:childTnLst>
+                    </p:cTn>
+                  </p:par>
+                  <p:par>
+                    <p:cTn id="13" fill="hold">
+                      <p:stCondLst>
+                        <p:cond delay="indefinite"/>
+                      </p:stCondLst>
+                      <p:childTnLst>
+                        <p:par>
+                          <p:cTn id="14" fill="hold">
+                            <p:stCondLst>
+                              <p:cond delay="0"/>
+                            </p:stCondLst>
+                            <p:childTnLst>
+                              <p:par>
+                                <p:cTn id="15" presetID="1" presetClass="entr" presetSubtype="0" fill="hold" nodeType="clickEffect">
+                                  <p:stCondLst>
+                                    <p:cond delay="0"/>
+                                  </p:stCondLst>
+                                  <p:childTnLst>
+                                    <p:set>
+                                      <p:cBhvr>
+                                        <p:cTn id="16" dur="1" fill="hold">
+                                          <p:stCondLst>
+                                            <p:cond delay="0"/>
+                                          </p:stCondLst>
+                                        </p:cTn>
+                                        <p:tgtEl>
+                                          <p:spTgt spid="3">
+                                            <p:txEl>
+                                              <p:pRg st="4" end="4"/>
+                                            </p:txEl>
+                                          </p:spTgt>
+                                        </p:tgtEl>
+                                        <p:attrNameLst>
+                                          <p:attrName>style.visibility</p:attrName>
+                                        </p:attrNameLst>
+                                      </p:cBhvr>
+                                      <p:to>
+                                        <p:strVal val="visible"/>
+                                      </p:to>
+                                    </p:set>
+                                  </p:childTnLst>
+                                </p:cTn>
+                              </p:par>
+                              <p:par>
+                                <p:cTn id="17" presetID="1" presetClass="entr" presetSubtype="0" fill="hold" nodeType="withEffect">
+                                  <p:stCondLst>
+                                    <p:cond delay="0"/>
+                                  </p:stCondLst>
+                                  <p:childTnLst>
+                                    <p:set>
+                                      <p:cBhvr>
+                                        <p:cTn id="18" dur="1" fill="hold">
+                                          <p:stCondLst>
+                                            <p:cond delay="0"/>
+                                          </p:stCondLst>
+                                        </p:cTn>
+                                        <p:tgtEl>
+                                          <p:spTgt spid="3">
+                                            <p:txEl>
+                                              <p:pRg st="5" end="5"/>
+                                            </p:txEl>
+                                          </p:spTgt>
+                                        </p:tgtEl>
+                                        <p:attrNameLst>
+                                          <p:attrName>style.visibility</p:attrName>
+                                        </p:attrNameLst>
+                                      </p:cBhvr>
+                                      <p:to>
+                                        <p:strVal val="visible"/>
+                                      </p:to>
+                                    </p:set>
+                                  </p:childTnLst>
+                                </p:cTn>
+                              </p:par>
+                              <p:par>
+                                <p:cTn id="19" presetID="1" presetClass="entr" presetSubtype="0" fill="hold" nodeType="withEffect">
+                                  <p:stCondLst>
+                                    <p:cond delay="0"/>
+                                  </p:stCondLst>
+                                  <p:childTnLst>
+                                    <p:set>
+                                      <p:cBhvr>
+                                        <p:cTn id="20" dur="1" fill="hold">
+                                          <p:stCondLst>
+                                            <p:cond delay="0"/>
+                                          </p:stCondLst>
+                                        </p:cTn>
+                                        <p:tgtEl>
+                                          <p:spTgt spid="3">
+                                            <p:txEl>
+                                              <p:pRg st="6" end="6"/>
+                                            </p:txEl>
+                                          </p:spTgt>
+                                        </p:tgtEl>
+                                        <p:attrNameLst>
+                                          <p:attrName>style.visibility</p:attrName>
+                                        </p:attrNameLst>
+                                      </p:cBhvr>
+                                      <p:to>
+                                        <p:strVal val="visible"/>
+                                      </p:to>
+                                    </p:set>
+                                  </p:childTnLst>
+                                </p:cTn>
+                              </p:par>
+                            </p:childTnLst>
+                          </p:cTn>
+                        </p:par>
+                      </p:childTnLst>
+                    </p:cTn>
+                  </p:par>
+                </p:childTnLst>
+              </p:cTn>
+              <p:prevCondLst>
+                <p:cond evt="onPrev" delay="0">
+                  <p:tgtEl>
+                    <p:sldTgt/>
+                  </p:tgtEl>
+                </p:cond>
+              </p:prevCondLst>
+              <p:nextCondLst>
+                <p:cond evt="onNext" delay="0">
+                  <p:tgtEl>
+                    <p:sldTgt/>
+                  </p:tgtEl>
+                </p:cond>
+              </p:nextCondLst>
+            </p:seq>
+          </p:childTnLst>
+        </p:cTn>
+      </p:par>
+    </p:tnLst>
+  </p:timing>
 </p:sld>
 </file>
 

</xml_diff>